<commit_message>
webpack-presentation/fix: change places of some slides
</commit_message>
<xml_diff>
--- a/webpack-presentation.pptx
+++ b/webpack-presentation.pptx
@@ -12,8 +12,8 @@
     <p:sldId id="257" r:id="rId3"/>
     <p:sldId id="258" r:id="rId4"/>
     <p:sldId id="259" r:id="rId5"/>
-    <p:sldId id="262" r:id="rId6"/>
-    <p:sldId id="264" r:id="rId7"/>
+    <p:sldId id="264" r:id="rId6"/>
+    <p:sldId id="262" r:id="rId7"/>
     <p:sldId id="266" r:id="rId8"/>
     <p:sldId id="267" r:id="rId9"/>
     <p:sldId id="268" r:id="rId10"/>
@@ -2195,7 +2195,7 @@
           <a:p>
             <a:fld id="{CF7F067E-DC4F-4F5E-85B2-969017E33A3B}" type="slidenum">
               <a:rPr lang="ru-RU"/>
-              <a:t>‹#›</a:t>
+              <a:t>19</a:t>
             </a:fld>
             <a:endParaRPr lang="ru-RU"/>
           </a:p>
@@ -2279,7 +2279,7 @@
           <a:p>
             <a:fld id="{CF7F067E-DC4F-4F5E-85B2-969017E33A3B}" type="slidenum">
               <a:rPr lang="ru-RU"/>
-              <a:t>‹#›</a:t>
+              <a:t>20</a:t>
             </a:fld>
             <a:endParaRPr lang="ru-RU"/>
           </a:p>
@@ -2605,7 +2605,7 @@
           <a:p>
             <a:fld id="{CF7F067E-DC4F-4F5E-85B2-969017E33A3B}" type="slidenum">
               <a:rPr lang="ru-RU"/>
-              <a:t>‹#›</a:t>
+              <a:t>21</a:t>
             </a:fld>
             <a:endParaRPr lang="ru-RU"/>
           </a:p>
@@ -2689,7 +2689,7 @@
           <a:p>
             <a:fld id="{CF7F067E-DC4F-4F5E-85B2-969017E33A3B}" type="slidenum">
               <a:rPr lang="ru-RU"/>
-              <a:t>‹#›</a:t>
+              <a:t>22</a:t>
             </a:fld>
             <a:endParaRPr lang="ru-RU"/>
           </a:p>
@@ -2773,7 +2773,7 @@
           <a:p>
             <a:fld id="{CF7F067E-DC4F-4F5E-85B2-969017E33A3B}" type="slidenum">
               <a:rPr lang="ru-RU"/>
-              <a:t>‹#›</a:t>
+              <a:t>23</a:t>
             </a:fld>
             <a:endParaRPr lang="ru-RU"/>
           </a:p>
@@ -2888,7 +2888,7 @@
           <a:p>
             <a:fld id="{CF7F067E-DC4F-4F5E-85B2-969017E33A3B}" type="slidenum">
               <a:rPr lang="ru-RU"/>
-              <a:t>‹#›</a:t>
+              <a:t>24</a:t>
             </a:fld>
             <a:endParaRPr lang="ru-RU"/>
           </a:p>
@@ -3095,7 +3095,7 @@
           <a:p>
             <a:fld id="{CF7F067E-DC4F-4F5E-85B2-969017E33A3B}" type="slidenum">
               <a:rPr lang="ru-RU"/>
-              <a:t>‹#›</a:t>
+              <a:t>25</a:t>
             </a:fld>
             <a:endParaRPr lang="ru-RU"/>
           </a:p>
@@ -3194,7 +3194,7 @@
           <a:p>
             <a:fld id="{CF7F067E-DC4F-4F5E-85B2-969017E33A3B}" type="slidenum">
               <a:rPr lang="ru-RU"/>
-              <a:t>‹#›</a:t>
+              <a:t>26</a:t>
             </a:fld>
             <a:endParaRPr lang="ru-RU"/>
           </a:p>
@@ -3278,7 +3278,7 @@
           <a:p>
             <a:fld id="{CF7F067E-DC4F-4F5E-85B2-969017E33A3B}" type="slidenum">
               <a:rPr lang="ru-RU"/>
-              <a:t>19</a:t>
+              <a:t>27</a:t>
             </a:fld>
             <a:endParaRPr lang="ru-RU"/>
           </a:p>
@@ -3510,15 +3510,130 @@
             </a:r>
             <a:r>
               <a:rPr lang="ru-RU" dirty="0" err="1"/>
-              <a:t>Work</a:t>
-            </a:r>
-            <a:r>
-              <a:rPr lang="ru-RU" dirty="0"/>
-              <a:t> </a:t>
-            </a:r>
-            <a:r>
-              <a:rPr lang="ru-RU" dirty="0" err="1"/>
-              <a:t>desription</a:t>
+              <a:t>What</a:t>
+            </a:r>
+            <a:r>
+              <a:rPr lang="ru-RU" dirty="0"/>
+              <a:t> </a:t>
+            </a:r>
+            <a:r>
+              <a:rPr lang="ru-RU" dirty="0" err="1"/>
+              <a:t>webpack</a:t>
+            </a:r>
+            <a:r>
+              <a:rPr lang="ru-RU" dirty="0"/>
+              <a:t> </a:t>
+            </a:r>
+            <a:r>
+              <a:rPr lang="ru-RU" dirty="0" err="1"/>
+              <a:t>is</a:t>
+            </a:r>
+            <a:endParaRPr lang="ru-RU" dirty="0">
+              <a:latin typeface="Calibri"/>
+            </a:endParaRPr>
+          </a:p>
+          <a:p>
+            <a:r>
+              <a:rPr lang="ru-RU" dirty="0"/>
+              <a:t>2) </a:t>
+            </a:r>
+            <a:r>
+              <a:rPr lang="ru-RU" dirty="0" err="1"/>
+              <a:t>creaters</a:t>
+            </a:r>
+            <a:r>
+              <a:rPr lang="ru-RU" dirty="0"/>
+              <a:t> </a:t>
+            </a:r>
+            <a:r>
+              <a:rPr lang="ru-RU" dirty="0" err="1"/>
+              <a:t>position</a:t>
+            </a:r>
+            <a:r>
+              <a:rPr lang="ru-RU" dirty="0"/>
+              <a:t> </a:t>
+            </a:r>
+            <a:r>
+              <a:rPr lang="ru-RU" dirty="0" err="1"/>
+              <a:t>about</a:t>
+            </a:r>
+            <a:r>
+              <a:rPr lang="ru-RU" dirty="0"/>
+              <a:t> </a:t>
+            </a:r>
+            <a:r>
+              <a:rPr lang="ru-RU" dirty="0" err="1"/>
+              <a:t>webpack</a:t>
+            </a:r>
+            <a:r>
+              <a:rPr lang="ru-RU" dirty="0"/>
+              <a:t>(</a:t>
+            </a:r>
+            <a:r>
+              <a:rPr lang="ru-RU" dirty="0" err="1"/>
+              <a:t>Predestination</a:t>
+            </a:r>
+            <a:r>
+              <a:rPr lang="ru-RU" dirty="0"/>
+              <a:t>)</a:t>
+            </a:r>
+          </a:p>
+          <a:p>
+            <a:r>
+              <a:rPr lang="ru-RU" dirty="0"/>
+              <a:t>3) </a:t>
+            </a:r>
+            <a:r>
+              <a:rPr lang="ru-RU" dirty="0" err="1"/>
+              <a:t>Differences</a:t>
+            </a:r>
+            <a:r>
+              <a:rPr lang="ru-RU" dirty="0"/>
+              <a:t>: </a:t>
+            </a:r>
+            <a:r>
+              <a:rPr lang="ru-RU" dirty="0" err="1"/>
+              <a:t>splitting</a:t>
+            </a:r>
+            <a:r>
+              <a:rPr lang="ru-RU" dirty="0"/>
+              <a:t> 2 </a:t>
+            </a:r>
+            <a:r>
+              <a:rPr lang="ru-RU" dirty="0" err="1"/>
+              <a:t>types</a:t>
+            </a:r>
+            <a:r>
+              <a:rPr lang="ru-RU" dirty="0"/>
+              <a:t>, </a:t>
+            </a:r>
+            <a:r>
+              <a:rPr lang="ru-RU" dirty="0" err="1"/>
+              <a:t>loaders</a:t>
+            </a:r>
+            <a:r>
+              <a:rPr lang="ru-RU" dirty="0"/>
+              <a:t>, </a:t>
+            </a:r>
+            <a:r>
+              <a:rPr lang="ru-RU" dirty="0" err="1"/>
+              <a:t>parsing</a:t>
+            </a:r>
+            <a:r>
+              <a:rPr lang="ru-RU" dirty="0"/>
+              <a:t>, </a:t>
+            </a:r>
+            <a:r>
+              <a:rPr lang="ru-RU" dirty="0" err="1"/>
+              <a:t>Plugin</a:t>
+            </a:r>
+            <a:r>
+              <a:rPr lang="ru-RU" dirty="0"/>
+              <a:t> </a:t>
+            </a:r>
+            <a:r>
+              <a:rPr lang="ru-RU" dirty="0" err="1"/>
+              <a:t>system</a:t>
             </a:r>
           </a:p>
         </p:txBody>
@@ -3540,7 +3655,7 @@
           <a:p>
             <a:fld id="{CF7F067E-DC4F-4F5E-85B2-969017E33A3B}" type="slidenum">
               <a:rPr lang="ru-RU"/>
-              <a:t>5</a:t>
+              <a:t>6</a:t>
             </a:fld>
             <a:endParaRPr lang="ru-RU"/>
           </a:p>
@@ -3549,7 +3664,7 @@
     </p:spTree>
     <p:extLst>
       <p:ext uri="{BB962C8B-B14F-4D97-AF65-F5344CB8AC3E}">
-        <p14:creationId xmlns:p14="http://schemas.microsoft.com/office/powerpoint/2010/main" val="3211035648"/>
+        <p14:creationId xmlns:p14="http://schemas.microsoft.com/office/powerpoint/2010/main" val="4198123518"/>
       </p:ext>
     </p:extLst>
   </p:cSld>
@@ -3609,130 +3724,15 @@
             </a:r>
             <a:r>
               <a:rPr lang="ru-RU" dirty="0" err="1"/>
-              <a:t>What</a:t>
-            </a:r>
-            <a:r>
-              <a:rPr lang="ru-RU" dirty="0"/>
-              <a:t> </a:t>
-            </a:r>
-            <a:r>
-              <a:rPr lang="ru-RU" dirty="0" err="1"/>
-              <a:t>webpack</a:t>
-            </a:r>
-            <a:r>
-              <a:rPr lang="ru-RU" dirty="0"/>
-              <a:t> </a:t>
-            </a:r>
-            <a:r>
-              <a:rPr lang="ru-RU" dirty="0" err="1"/>
-              <a:t>is</a:t>
-            </a:r>
-            <a:endParaRPr lang="ru-RU" dirty="0">
-              <a:latin typeface="Calibri"/>
-            </a:endParaRPr>
-          </a:p>
-          <a:p>
-            <a:r>
-              <a:rPr lang="ru-RU" dirty="0"/>
-              <a:t>2) </a:t>
-            </a:r>
-            <a:r>
-              <a:rPr lang="ru-RU" dirty="0" err="1"/>
-              <a:t>creaters</a:t>
-            </a:r>
-            <a:r>
-              <a:rPr lang="ru-RU" dirty="0"/>
-              <a:t> </a:t>
-            </a:r>
-            <a:r>
-              <a:rPr lang="ru-RU" dirty="0" err="1"/>
-              <a:t>position</a:t>
-            </a:r>
-            <a:r>
-              <a:rPr lang="ru-RU" dirty="0"/>
-              <a:t> </a:t>
-            </a:r>
-            <a:r>
-              <a:rPr lang="ru-RU" dirty="0" err="1"/>
-              <a:t>about</a:t>
-            </a:r>
-            <a:r>
-              <a:rPr lang="ru-RU" dirty="0"/>
-              <a:t> </a:t>
-            </a:r>
-            <a:r>
-              <a:rPr lang="ru-RU" dirty="0" err="1"/>
-              <a:t>webpack</a:t>
-            </a:r>
-            <a:r>
-              <a:rPr lang="ru-RU" dirty="0"/>
-              <a:t>(</a:t>
-            </a:r>
-            <a:r>
-              <a:rPr lang="ru-RU" dirty="0" err="1"/>
-              <a:t>Predestination</a:t>
-            </a:r>
-            <a:r>
-              <a:rPr lang="ru-RU" dirty="0"/>
-              <a:t>)</a:t>
-            </a:r>
-          </a:p>
-          <a:p>
-            <a:r>
-              <a:rPr lang="ru-RU" dirty="0"/>
-              <a:t>3) </a:t>
-            </a:r>
-            <a:r>
-              <a:rPr lang="ru-RU" dirty="0" err="1"/>
-              <a:t>Differences</a:t>
-            </a:r>
-            <a:r>
-              <a:rPr lang="ru-RU" dirty="0"/>
-              <a:t>: </a:t>
-            </a:r>
-            <a:r>
-              <a:rPr lang="ru-RU" dirty="0" err="1"/>
-              <a:t>splitting</a:t>
-            </a:r>
-            <a:r>
-              <a:rPr lang="ru-RU" dirty="0"/>
-              <a:t> 2 </a:t>
-            </a:r>
-            <a:r>
-              <a:rPr lang="ru-RU" dirty="0" err="1"/>
-              <a:t>types</a:t>
-            </a:r>
-            <a:r>
-              <a:rPr lang="ru-RU" dirty="0"/>
-              <a:t>, </a:t>
-            </a:r>
-            <a:r>
-              <a:rPr lang="ru-RU" dirty="0" err="1"/>
-              <a:t>loaders</a:t>
-            </a:r>
-            <a:r>
-              <a:rPr lang="ru-RU" dirty="0"/>
-              <a:t>, </a:t>
-            </a:r>
-            <a:r>
-              <a:rPr lang="ru-RU" dirty="0" err="1"/>
-              <a:t>parsing</a:t>
-            </a:r>
-            <a:r>
-              <a:rPr lang="ru-RU" dirty="0"/>
-              <a:t>, </a:t>
-            </a:r>
-            <a:r>
-              <a:rPr lang="ru-RU" dirty="0" err="1"/>
-              <a:t>Plugin</a:t>
-            </a:r>
-            <a:r>
-              <a:rPr lang="ru-RU" dirty="0"/>
-              <a:t> </a:t>
-            </a:r>
-            <a:r>
-              <a:rPr lang="ru-RU" dirty="0" err="1"/>
-              <a:t>system</a:t>
+              <a:t>Work</a:t>
+            </a:r>
+            <a:r>
+              <a:rPr lang="ru-RU" dirty="0"/>
+              <a:t> </a:t>
+            </a:r>
+            <a:r>
+              <a:rPr lang="ru-RU" dirty="0" err="1"/>
+              <a:t>desription</a:t>
             </a:r>
           </a:p>
         </p:txBody>
@@ -3754,7 +3754,7 @@
           <a:p>
             <a:fld id="{CF7F067E-DC4F-4F5E-85B2-969017E33A3B}" type="slidenum">
               <a:rPr lang="ru-RU"/>
-              <a:t>6</a:t>
+              <a:t>5</a:t>
             </a:fld>
             <a:endParaRPr lang="ru-RU"/>
           </a:p>
@@ -3763,7 +3763,7 @@
     </p:spTree>
     <p:extLst>
       <p:ext uri="{BB962C8B-B14F-4D97-AF65-F5344CB8AC3E}">
-        <p14:creationId xmlns:p14="http://schemas.microsoft.com/office/powerpoint/2010/main" val="4198123518"/>
+        <p14:creationId xmlns:p14="http://schemas.microsoft.com/office/powerpoint/2010/main" val="3211035648"/>
       </p:ext>
     </p:extLst>
   </p:cSld>
@@ -14118,6 +14118,580 @@
           <a:lstStyle/>
           <a:p>
             <a:r>
+              <a:rPr lang="ru-RU" dirty="0" err="1">
+                <a:latin typeface="Century Gothic"/>
+              </a:rPr>
+              <a:t>What</a:t>
+            </a:r>
+            <a:r>
+              <a:rPr lang="ru-RU" dirty="0">
+                <a:latin typeface="Century GothicWha"/>
+              </a:rPr>
+              <a:t> </a:t>
+            </a:r>
+            <a:r>
+              <a:rPr lang="ru-RU" dirty="0" err="1">
+                <a:latin typeface="Century GothicWha"/>
+              </a:rPr>
+              <a:t>is</a:t>
+            </a:r>
+            <a:r>
+              <a:rPr lang="ru-RU" dirty="0">
+                <a:latin typeface="Century GothicWha"/>
+              </a:rPr>
+              <a:t> </a:t>
+            </a:r>
+            <a:r>
+              <a:rPr lang="ru-RU" dirty="0" err="1">
+                <a:latin typeface="Century GothicWha"/>
+              </a:rPr>
+              <a:t>it</a:t>
+            </a:r>
+            <a:r>
+              <a:rPr lang="ru-RU" dirty="0">
+                <a:latin typeface="Century GothicWha"/>
+              </a:rPr>
+              <a:t>?</a:t>
+            </a:r>
+          </a:p>
+        </p:txBody>
+      </p:sp>
+      <p:sp>
+        <p:nvSpPr>
+          <p:cNvPr id="3" name="Объект 2"/>
+          <p:cNvSpPr>
+            <a:spLocks noGrp="1"/>
+          </p:cNvSpPr>
+          <p:nvPr>
+            <p:ph sz="half" idx="1"/>
+          </p:nvPr>
+        </p:nvSpPr>
+        <p:spPr>
+          <a:xfrm>
+            <a:off x="1298575" y="1371600"/>
+            <a:ext cx="9830141" cy="1547813"/>
+          </a:xfrm>
+        </p:spPr>
+        <p:txBody>
+          <a:bodyPr vert="horz" lIns="91440" tIns="45720" rIns="91440" bIns="45720" rtlCol="0" anchor="t">
+            <a:normAutofit/>
+          </a:bodyPr>
+          <a:lstStyle/>
+          <a:p>
+            <a:pPr marL="0" indent="0">
+              <a:buNone/>
+            </a:pPr>
+            <a:r>
+              <a:rPr lang="ru-RU" dirty="0" err="1">
+                <a:solidFill>
+                  <a:srgbClr val="FFFFFF"/>
+                </a:solidFill>
+                <a:latin typeface="Century Gothic"/>
+              </a:rPr>
+              <a:t>Webpack</a:t>
+            </a:r>
+            <a:r>
+              <a:rPr lang="ru-RU" dirty="0">
+                <a:solidFill>
+                  <a:srgbClr val="FFFFFF"/>
+                </a:solidFill>
+                <a:latin typeface="Century Gothic"/>
+              </a:rPr>
+              <a:t> </a:t>
+            </a:r>
+            <a:r>
+              <a:rPr lang="ru-RU" dirty="0" err="1">
+                <a:solidFill>
+                  <a:srgbClr val="FFFFFF"/>
+                </a:solidFill>
+                <a:latin typeface="Century Gothic"/>
+              </a:rPr>
+              <a:t>takes</a:t>
+            </a:r>
+            <a:r>
+              <a:rPr lang="ru-RU" dirty="0">
+                <a:solidFill>
+                  <a:srgbClr val="FFFFFF"/>
+                </a:solidFill>
+                <a:latin typeface="Century Gothic"/>
+              </a:rPr>
+              <a:t> </a:t>
+            </a:r>
+            <a:r>
+              <a:rPr lang="ru-RU" dirty="0" err="1">
+                <a:solidFill>
+                  <a:srgbClr val="FFFFFF"/>
+                </a:solidFill>
+                <a:latin typeface="Century Gothic"/>
+              </a:rPr>
+              <a:t>modules</a:t>
+            </a:r>
+            <a:r>
+              <a:rPr lang="ru-RU" dirty="0">
+                <a:solidFill>
+                  <a:srgbClr val="FFFFFF"/>
+                </a:solidFill>
+                <a:latin typeface="Century Gothic"/>
+              </a:rPr>
+              <a:t> </a:t>
+            </a:r>
+            <a:r>
+              <a:rPr lang="ru-RU" dirty="0" err="1">
+                <a:solidFill>
+                  <a:srgbClr val="FFFFFF"/>
+                </a:solidFill>
+                <a:latin typeface="Century Gothic"/>
+              </a:rPr>
+              <a:t>with</a:t>
+            </a:r>
+            <a:r>
+              <a:rPr lang="ru-RU" dirty="0">
+                <a:solidFill>
+                  <a:srgbClr val="FFFFFF"/>
+                </a:solidFill>
+                <a:latin typeface="Century Gothic"/>
+              </a:rPr>
+              <a:t> </a:t>
+            </a:r>
+            <a:r>
+              <a:rPr lang="ru-RU" dirty="0" err="1">
+                <a:solidFill>
+                  <a:srgbClr val="FFFFFF"/>
+                </a:solidFill>
+                <a:latin typeface="Century Gothic"/>
+              </a:rPr>
+              <a:t>dependencies</a:t>
+            </a:r>
+            <a:r>
+              <a:rPr lang="ru-RU" dirty="0">
+                <a:solidFill>
+                  <a:srgbClr val="FFFFFF"/>
+                </a:solidFill>
+                <a:latin typeface="Century Gothic"/>
+              </a:rPr>
+              <a:t> </a:t>
+            </a:r>
+            <a:r>
+              <a:rPr lang="ru-RU" dirty="0" err="1">
+                <a:solidFill>
+                  <a:srgbClr val="FFFFFF"/>
+                </a:solidFill>
+                <a:latin typeface="Century Gothic"/>
+              </a:rPr>
+              <a:t>and</a:t>
+            </a:r>
+            <a:r>
+              <a:rPr lang="ru-RU" dirty="0">
+                <a:solidFill>
+                  <a:srgbClr val="FFFFFF"/>
+                </a:solidFill>
+                <a:latin typeface="Century Gothic"/>
+              </a:rPr>
+              <a:t> </a:t>
+            </a:r>
+            <a:r>
+              <a:rPr lang="ru-RU" dirty="0" err="1">
+                <a:solidFill>
+                  <a:srgbClr val="FFFFFF"/>
+                </a:solidFill>
+                <a:latin typeface="Century Gothic"/>
+              </a:rPr>
+              <a:t>generates</a:t>
+            </a:r>
+            <a:r>
+              <a:rPr lang="ru-RU" dirty="0">
+                <a:solidFill>
+                  <a:srgbClr val="FFFFFF"/>
+                </a:solidFill>
+                <a:latin typeface="Century Gothic"/>
+              </a:rPr>
+              <a:t> </a:t>
+            </a:r>
+            <a:r>
+              <a:rPr lang="ru-RU" dirty="0" err="1">
+                <a:solidFill>
+                  <a:srgbClr val="FFFFFF"/>
+                </a:solidFill>
+                <a:latin typeface="Century Gothic"/>
+              </a:rPr>
+              <a:t>static</a:t>
+            </a:r>
+            <a:r>
+              <a:rPr lang="ru-RU" dirty="0">
+                <a:solidFill>
+                  <a:srgbClr val="FFFFFF"/>
+                </a:solidFill>
+                <a:latin typeface="Century Gothic"/>
+              </a:rPr>
+              <a:t> </a:t>
+            </a:r>
+            <a:r>
+              <a:rPr lang="ru-RU" dirty="0" err="1">
+                <a:solidFill>
+                  <a:srgbClr val="FFFFFF"/>
+                </a:solidFill>
+                <a:latin typeface="Century Gothic"/>
+              </a:rPr>
+              <a:t>assets</a:t>
+            </a:r>
+            <a:r>
+              <a:rPr lang="ru-RU" dirty="0">
+                <a:solidFill>
+                  <a:srgbClr val="FFFFFF"/>
+                </a:solidFill>
+                <a:latin typeface="Century Gothic"/>
+              </a:rPr>
+              <a:t> </a:t>
+            </a:r>
+            <a:r>
+              <a:rPr lang="ru-RU" dirty="0" err="1">
+                <a:solidFill>
+                  <a:srgbClr val="FFFFFF"/>
+                </a:solidFill>
+                <a:latin typeface="Century Gothic"/>
+              </a:rPr>
+              <a:t>representing</a:t>
+            </a:r>
+            <a:r>
+              <a:rPr lang="ru-RU" dirty="0">
+                <a:solidFill>
+                  <a:srgbClr val="FFFFFF"/>
+                </a:solidFill>
+                <a:latin typeface="Century Gothic"/>
+              </a:rPr>
+              <a:t> </a:t>
+            </a:r>
+            <a:r>
+              <a:rPr lang="ru-RU" dirty="0" err="1">
+                <a:solidFill>
+                  <a:srgbClr val="FFFFFF"/>
+                </a:solidFill>
+                <a:latin typeface="Century Gothic"/>
+              </a:rPr>
+              <a:t>those</a:t>
+            </a:r>
+            <a:r>
+              <a:rPr lang="ru-RU" dirty="0">
+                <a:solidFill>
+                  <a:srgbClr val="FFFFFF"/>
+                </a:solidFill>
+                <a:latin typeface="Century Gothic"/>
+              </a:rPr>
+              <a:t> </a:t>
+            </a:r>
+            <a:r>
+              <a:rPr lang="ru-RU" dirty="0" err="1">
+                <a:solidFill>
+                  <a:srgbClr val="FFFFFF"/>
+                </a:solidFill>
+                <a:latin typeface="Century Gothic"/>
+              </a:rPr>
+              <a:t>modules</a:t>
+            </a:r>
+          </a:p>
+        </p:txBody>
+      </p:sp>
+      <p:sp>
+        <p:nvSpPr>
+          <p:cNvPr id="8" name="TextBox 7"/>
+          <p:cNvSpPr txBox="1"/>
+          <p:nvPr/>
+        </p:nvSpPr>
+        <p:spPr>
+          <a:xfrm>
+            <a:off x="646111" y="2629619"/>
+            <a:ext cx="7034783" cy="584775"/>
+          </a:xfrm>
+          <a:prstGeom prst="rect">
+            <a:avLst/>
+          </a:prstGeom>
+        </p:spPr>
+        <p:txBody>
+          <a:bodyPr rtlCol="0">
+            <a:spAutoFit/>
+          </a:bodyPr>
+          <a:lstStyle/>
+          <a:p>
+            <a:r>
+              <a:rPr lang="ru-RU" sz="3200" dirty="0" err="1">
+                <a:solidFill>
+                  <a:srgbClr val="FFFFFF"/>
+                </a:solidFill>
+                <a:latin typeface="Century Gothic"/>
+                <a:cs typeface="Helvetica"/>
+              </a:rPr>
+              <a:t>How</a:t>
+            </a:r>
+            <a:r>
+              <a:rPr lang="ru-RU" sz="3200" dirty="0">
+                <a:solidFill>
+                  <a:srgbClr val="FFFFFF"/>
+                </a:solidFill>
+                <a:latin typeface="Century Gothic"/>
+                <a:cs typeface="Helvetica"/>
+              </a:rPr>
+              <a:t> </a:t>
+            </a:r>
+            <a:r>
+              <a:rPr lang="ru-RU" sz="3200" dirty="0" err="1">
+                <a:solidFill>
+                  <a:srgbClr val="FFFFFF"/>
+                </a:solidFill>
+                <a:latin typeface="Century Gothic"/>
+                <a:cs typeface="Helvetica"/>
+              </a:rPr>
+              <a:t>is</a:t>
+            </a:r>
+            <a:r>
+              <a:rPr lang="ru-RU" sz="3200" dirty="0">
+                <a:solidFill>
+                  <a:srgbClr val="FFFFFF"/>
+                </a:solidFill>
+                <a:latin typeface="Century Gothic"/>
+                <a:cs typeface="Helvetica"/>
+              </a:rPr>
+              <a:t> </a:t>
+            </a:r>
+            <a:r>
+              <a:rPr lang="ru-RU" sz="3200" dirty="0" err="1">
+                <a:solidFill>
+                  <a:srgbClr val="FFFFFF"/>
+                </a:solidFill>
+                <a:latin typeface="Century Gothic"/>
+                <a:cs typeface="Helvetica"/>
+              </a:rPr>
+              <a:t>webpack</a:t>
+            </a:r>
+            <a:r>
+              <a:rPr lang="ru-RU" sz="3200" dirty="0">
+                <a:solidFill>
+                  <a:srgbClr val="FFFFFF"/>
+                </a:solidFill>
+                <a:latin typeface="Century Gothic"/>
+                <a:cs typeface="Helvetica"/>
+              </a:rPr>
+              <a:t> </a:t>
+            </a:r>
+            <a:r>
+              <a:rPr lang="ru-RU" sz="3200" dirty="0" err="1">
+                <a:solidFill>
+                  <a:srgbClr val="FFFFFF"/>
+                </a:solidFill>
+                <a:latin typeface="Century Gothic"/>
+                <a:cs typeface="Helvetica"/>
+              </a:rPr>
+              <a:t>different</a:t>
+            </a:r>
+            <a:r>
+              <a:rPr lang="ru-RU" sz="3200" dirty="0">
+                <a:solidFill>
+                  <a:srgbClr val="FFFFFF"/>
+                </a:solidFill>
+                <a:latin typeface="Century Gothic"/>
+                <a:cs typeface="Helvetica"/>
+              </a:rPr>
+              <a:t>:</a:t>
+            </a:r>
+          </a:p>
+        </p:txBody>
+      </p:sp>
+      <p:sp>
+        <p:nvSpPr>
+          <p:cNvPr id="9" name="TextBox 8"/>
+          <p:cNvSpPr txBox="1"/>
+          <p:nvPr/>
+        </p:nvSpPr>
+        <p:spPr>
+          <a:xfrm>
+            <a:off x="1298575" y="3667125"/>
+            <a:ext cx="2743200" cy="1477328"/>
+          </a:xfrm>
+          <a:prstGeom prst="rect">
+            <a:avLst/>
+          </a:prstGeom>
+        </p:spPr>
+        <p:txBody>
+          <a:bodyPr rtlCol="0">
+            <a:spAutoFit/>
+          </a:bodyPr>
+          <a:lstStyle/>
+          <a:p>
+            <a:pPr marL="285750" indent="-285750">
+              <a:buFont typeface="Arial" panose="020B0604020202020204" pitchFamily="34" charset="0"/>
+              <a:buChar char="•"/>
+            </a:pPr>
+            <a:r>
+              <a:rPr lang="ru-RU" dirty="0" err="1">
+                <a:solidFill>
+                  <a:srgbClr val="FFFFFF"/>
+                </a:solidFill>
+                <a:latin typeface="Century Gothic"/>
+              </a:rPr>
+              <a:t>Code</a:t>
+            </a:r>
+            <a:r>
+              <a:rPr lang="ru-RU" dirty="0">
+                <a:solidFill>
+                  <a:srgbClr val="FFFFFF"/>
+                </a:solidFill>
+                <a:latin typeface="Century Gothic"/>
+              </a:rPr>
+              <a:t> </a:t>
+            </a:r>
+            <a:r>
+              <a:rPr lang="ru-RU" dirty="0" err="1">
+                <a:solidFill>
+                  <a:srgbClr val="FFFFFF"/>
+                </a:solidFill>
+                <a:latin typeface="Century Gothic"/>
+              </a:rPr>
+              <a:t>Splitting</a:t>
+            </a:r>
+            <a:endParaRPr lang="ru-RU" dirty="0" err="1">
+              <a:solidFill>
+                <a:srgbClr val="006A86"/>
+              </a:solidFill>
+              <a:latin typeface="Century Gothic"/>
+              <a:hlinkClick r:id="rId3"/>
+            </a:endParaRPr>
+          </a:p>
+          <a:p>
+            <a:pPr marL="285750" indent="-285750">
+              <a:buFont typeface="Arial" panose="020B0604020202020204" pitchFamily="34" charset="0"/>
+              <a:buChar char="•"/>
+            </a:pPr>
+            <a:r>
+              <a:rPr lang="ru-RU" dirty="0" err="1">
+                <a:solidFill>
+                  <a:srgbClr val="FFFFFF"/>
+                </a:solidFill>
+                <a:latin typeface="Century Gothic"/>
+              </a:rPr>
+              <a:t>Loaders</a:t>
+            </a:r>
+          </a:p>
+          <a:p>
+            <a:pPr marL="285750" indent="-285750">
+              <a:buFont typeface="Arial" panose="020B0604020202020204" pitchFamily="34" charset="0"/>
+              <a:buChar char="•"/>
+            </a:pPr>
+            <a:r>
+              <a:rPr lang="ru-RU" dirty="0" err="1">
+                <a:solidFill>
+                  <a:srgbClr val="FFFFFF"/>
+                </a:solidFill>
+                <a:latin typeface="Century Gothic"/>
+              </a:rPr>
+              <a:t>Clever</a:t>
+            </a:r>
+            <a:r>
+              <a:rPr lang="ru-RU" dirty="0">
+                <a:solidFill>
+                  <a:srgbClr val="FFFFFF"/>
+                </a:solidFill>
+                <a:latin typeface="Century Gothic"/>
+              </a:rPr>
+              <a:t> </a:t>
+            </a:r>
+            <a:r>
+              <a:rPr lang="ru-RU" dirty="0" err="1">
+                <a:solidFill>
+                  <a:srgbClr val="FFFFFF"/>
+                </a:solidFill>
+                <a:latin typeface="Century Gothic"/>
+              </a:rPr>
+              <a:t>parsing</a:t>
+            </a:r>
+          </a:p>
+          <a:p>
+            <a:pPr marL="285750" indent="-285750">
+              <a:buFont typeface="Arial" panose="020B0604020202020204" pitchFamily="34" charset="0"/>
+              <a:buChar char="•"/>
+            </a:pPr>
+            <a:r>
+              <a:rPr lang="ru-RU" dirty="0" err="1">
+                <a:solidFill>
+                  <a:srgbClr val="FFFFFF"/>
+                </a:solidFill>
+                <a:latin typeface="Century Gothic"/>
+              </a:rPr>
+              <a:t>Plugin</a:t>
+            </a:r>
+            <a:r>
+              <a:rPr lang="ru-RU" dirty="0">
+                <a:solidFill>
+                  <a:srgbClr val="FFFFFF"/>
+                </a:solidFill>
+                <a:latin typeface="Century Gothic"/>
+              </a:rPr>
+              <a:t> </a:t>
+            </a:r>
+            <a:r>
+              <a:rPr lang="ru-RU" dirty="0" err="1">
+                <a:solidFill>
+                  <a:srgbClr val="FFFFFF"/>
+                </a:solidFill>
+                <a:latin typeface="Century Gothic"/>
+              </a:rPr>
+              <a:t>system</a:t>
+            </a:r>
+          </a:p>
+          <a:p>
+            <a:endParaRPr lang="ru-RU" dirty="0">
+              <a:solidFill>
+                <a:srgbClr val="FFFFFF"/>
+              </a:solidFill>
+              <a:latin typeface="Century Gothic"/>
+            </a:endParaRPr>
+          </a:p>
+        </p:txBody>
+      </p:sp>
+    </p:spTree>
+    <p:extLst>
+      <p:ext uri="{BB962C8B-B14F-4D97-AF65-F5344CB8AC3E}">
+        <p14:creationId xmlns:p14="http://schemas.microsoft.com/office/powerpoint/2010/main" val="396840957"/>
+      </p:ext>
+    </p:extLst>
+  </p:cSld>
+  <p:clrMapOvr>
+    <a:masterClrMapping/>
+  </p:clrMapOvr>
+</p:sld>
+</file>
+
+<file path=ppt/slides/slide6.xml><?xml version="1.0" encoding="utf-8"?>
+<p:sld xmlns:a="http://schemas.openxmlformats.org/drawingml/2006/main" xmlns:r="http://schemas.openxmlformats.org/officeDocument/2006/relationships" xmlns:p="http://schemas.openxmlformats.org/presentationml/2006/main">
+  <p:cSld>
+    <p:spTree>
+      <p:nvGrpSpPr>
+        <p:cNvPr id="1" name=""/>
+        <p:cNvGrpSpPr/>
+        <p:nvPr/>
+      </p:nvGrpSpPr>
+      <p:grpSpPr>
+        <a:xfrm>
+          <a:off x="0" y="0"/>
+          <a:ext cx="0" cy="0"/>
+          <a:chOff x="0" y="0"/>
+          <a:chExt cx="0" cy="0"/>
+        </a:xfrm>
+      </p:grpSpPr>
+      <p:sp>
+        <p:nvSpPr>
+          <p:cNvPr id="2" name="Заголовок 1"/>
+          <p:cNvSpPr>
+            <a:spLocks noGrp="1"/>
+          </p:cNvSpPr>
+          <p:nvPr>
+            <p:ph type="title"/>
+          </p:nvPr>
+        </p:nvSpPr>
+        <p:spPr/>
+        <p:txBody>
+          <a:bodyPr/>
+          <a:lstStyle/>
+          <a:p>
+            <a:r>
               <a:rPr lang="ru-RU" dirty="0" err="1"/>
               <a:t>What</a:t>
             </a:r>
@@ -14186,580 +14760,6 @@
     <p:extLst>
       <p:ext uri="{BB962C8B-B14F-4D97-AF65-F5344CB8AC3E}">
         <p14:creationId xmlns:p14="http://schemas.microsoft.com/office/powerpoint/2010/main" val="3427701756"/>
-      </p:ext>
-    </p:extLst>
-  </p:cSld>
-  <p:clrMapOvr>
-    <a:masterClrMapping/>
-  </p:clrMapOvr>
-</p:sld>
-</file>
-
-<file path=ppt/slides/slide6.xml><?xml version="1.0" encoding="utf-8"?>
-<p:sld xmlns:a="http://schemas.openxmlformats.org/drawingml/2006/main" xmlns:r="http://schemas.openxmlformats.org/officeDocument/2006/relationships" xmlns:p="http://schemas.openxmlformats.org/presentationml/2006/main">
-  <p:cSld>
-    <p:spTree>
-      <p:nvGrpSpPr>
-        <p:cNvPr id="1" name=""/>
-        <p:cNvGrpSpPr/>
-        <p:nvPr/>
-      </p:nvGrpSpPr>
-      <p:grpSpPr>
-        <a:xfrm>
-          <a:off x="0" y="0"/>
-          <a:ext cx="0" cy="0"/>
-          <a:chOff x="0" y="0"/>
-          <a:chExt cx="0" cy="0"/>
-        </a:xfrm>
-      </p:grpSpPr>
-      <p:sp>
-        <p:nvSpPr>
-          <p:cNvPr id="2" name="Заголовок 1"/>
-          <p:cNvSpPr>
-            <a:spLocks noGrp="1"/>
-          </p:cNvSpPr>
-          <p:nvPr>
-            <p:ph type="title"/>
-          </p:nvPr>
-        </p:nvSpPr>
-        <p:spPr/>
-        <p:txBody>
-          <a:bodyPr/>
-          <a:lstStyle/>
-          <a:p>
-            <a:r>
-              <a:rPr lang="ru-RU" dirty="0" err="1">
-                <a:latin typeface="Century Gothic"/>
-              </a:rPr>
-              <a:t>What</a:t>
-            </a:r>
-            <a:r>
-              <a:rPr lang="ru-RU" dirty="0">
-                <a:latin typeface="Century GothicWha"/>
-              </a:rPr>
-              <a:t> </a:t>
-            </a:r>
-            <a:r>
-              <a:rPr lang="ru-RU" dirty="0" err="1">
-                <a:latin typeface="Century GothicWha"/>
-              </a:rPr>
-              <a:t>is</a:t>
-            </a:r>
-            <a:r>
-              <a:rPr lang="ru-RU" dirty="0">
-                <a:latin typeface="Century GothicWha"/>
-              </a:rPr>
-              <a:t> </a:t>
-            </a:r>
-            <a:r>
-              <a:rPr lang="ru-RU" dirty="0" err="1">
-                <a:latin typeface="Century GothicWha"/>
-              </a:rPr>
-              <a:t>it</a:t>
-            </a:r>
-            <a:r>
-              <a:rPr lang="ru-RU" dirty="0">
-                <a:latin typeface="Century GothicWha"/>
-              </a:rPr>
-              <a:t>?</a:t>
-            </a:r>
-          </a:p>
-        </p:txBody>
-      </p:sp>
-      <p:sp>
-        <p:nvSpPr>
-          <p:cNvPr id="3" name="Объект 2"/>
-          <p:cNvSpPr>
-            <a:spLocks noGrp="1"/>
-          </p:cNvSpPr>
-          <p:nvPr>
-            <p:ph sz="half" idx="1"/>
-          </p:nvPr>
-        </p:nvSpPr>
-        <p:spPr>
-          <a:xfrm>
-            <a:off x="1298575" y="1371600"/>
-            <a:ext cx="9830141" cy="1547813"/>
-          </a:xfrm>
-        </p:spPr>
-        <p:txBody>
-          <a:bodyPr vert="horz" lIns="91440" tIns="45720" rIns="91440" bIns="45720" rtlCol="0" anchor="t">
-            <a:normAutofit/>
-          </a:bodyPr>
-          <a:lstStyle/>
-          <a:p>
-            <a:pPr marL="0" indent="0">
-              <a:buNone/>
-            </a:pPr>
-            <a:r>
-              <a:rPr lang="ru-RU" dirty="0" err="1">
-                <a:solidFill>
-                  <a:srgbClr val="FFFFFF"/>
-                </a:solidFill>
-                <a:latin typeface="Century Gothic"/>
-              </a:rPr>
-              <a:t>Webpack</a:t>
-            </a:r>
-            <a:r>
-              <a:rPr lang="ru-RU" dirty="0">
-                <a:solidFill>
-                  <a:srgbClr val="FFFFFF"/>
-                </a:solidFill>
-                <a:latin typeface="Century Gothic"/>
-              </a:rPr>
-              <a:t> </a:t>
-            </a:r>
-            <a:r>
-              <a:rPr lang="ru-RU" dirty="0" err="1">
-                <a:solidFill>
-                  <a:srgbClr val="FFFFFF"/>
-                </a:solidFill>
-                <a:latin typeface="Century Gothic"/>
-              </a:rPr>
-              <a:t>takes</a:t>
-            </a:r>
-            <a:r>
-              <a:rPr lang="ru-RU" dirty="0">
-                <a:solidFill>
-                  <a:srgbClr val="FFFFFF"/>
-                </a:solidFill>
-                <a:latin typeface="Century Gothic"/>
-              </a:rPr>
-              <a:t> </a:t>
-            </a:r>
-            <a:r>
-              <a:rPr lang="ru-RU" dirty="0" err="1">
-                <a:solidFill>
-                  <a:srgbClr val="FFFFFF"/>
-                </a:solidFill>
-                <a:latin typeface="Century Gothic"/>
-              </a:rPr>
-              <a:t>modules</a:t>
-            </a:r>
-            <a:r>
-              <a:rPr lang="ru-RU" dirty="0">
-                <a:solidFill>
-                  <a:srgbClr val="FFFFFF"/>
-                </a:solidFill>
-                <a:latin typeface="Century Gothic"/>
-              </a:rPr>
-              <a:t> </a:t>
-            </a:r>
-            <a:r>
-              <a:rPr lang="ru-RU" dirty="0" err="1">
-                <a:solidFill>
-                  <a:srgbClr val="FFFFFF"/>
-                </a:solidFill>
-                <a:latin typeface="Century Gothic"/>
-              </a:rPr>
-              <a:t>with</a:t>
-            </a:r>
-            <a:r>
-              <a:rPr lang="ru-RU" dirty="0">
-                <a:solidFill>
-                  <a:srgbClr val="FFFFFF"/>
-                </a:solidFill>
-                <a:latin typeface="Century Gothic"/>
-              </a:rPr>
-              <a:t> </a:t>
-            </a:r>
-            <a:r>
-              <a:rPr lang="ru-RU" dirty="0" err="1">
-                <a:solidFill>
-                  <a:srgbClr val="FFFFFF"/>
-                </a:solidFill>
-                <a:latin typeface="Century Gothic"/>
-              </a:rPr>
-              <a:t>dependencies</a:t>
-            </a:r>
-            <a:r>
-              <a:rPr lang="ru-RU" dirty="0">
-                <a:solidFill>
-                  <a:srgbClr val="FFFFFF"/>
-                </a:solidFill>
-                <a:latin typeface="Century Gothic"/>
-              </a:rPr>
-              <a:t> </a:t>
-            </a:r>
-            <a:r>
-              <a:rPr lang="ru-RU" dirty="0" err="1">
-                <a:solidFill>
-                  <a:srgbClr val="FFFFFF"/>
-                </a:solidFill>
-                <a:latin typeface="Century Gothic"/>
-              </a:rPr>
-              <a:t>and</a:t>
-            </a:r>
-            <a:r>
-              <a:rPr lang="ru-RU" dirty="0">
-                <a:solidFill>
-                  <a:srgbClr val="FFFFFF"/>
-                </a:solidFill>
-                <a:latin typeface="Century Gothic"/>
-              </a:rPr>
-              <a:t> </a:t>
-            </a:r>
-            <a:r>
-              <a:rPr lang="ru-RU" dirty="0" err="1">
-                <a:solidFill>
-                  <a:srgbClr val="FFFFFF"/>
-                </a:solidFill>
-                <a:latin typeface="Century Gothic"/>
-              </a:rPr>
-              <a:t>generates</a:t>
-            </a:r>
-            <a:r>
-              <a:rPr lang="ru-RU" dirty="0">
-                <a:solidFill>
-                  <a:srgbClr val="FFFFFF"/>
-                </a:solidFill>
-                <a:latin typeface="Century Gothic"/>
-              </a:rPr>
-              <a:t> </a:t>
-            </a:r>
-            <a:r>
-              <a:rPr lang="ru-RU" dirty="0" err="1">
-                <a:solidFill>
-                  <a:srgbClr val="FFFFFF"/>
-                </a:solidFill>
-                <a:latin typeface="Century Gothic"/>
-              </a:rPr>
-              <a:t>static</a:t>
-            </a:r>
-            <a:r>
-              <a:rPr lang="ru-RU" dirty="0">
-                <a:solidFill>
-                  <a:srgbClr val="FFFFFF"/>
-                </a:solidFill>
-                <a:latin typeface="Century Gothic"/>
-              </a:rPr>
-              <a:t> </a:t>
-            </a:r>
-            <a:r>
-              <a:rPr lang="ru-RU" dirty="0" err="1">
-                <a:solidFill>
-                  <a:srgbClr val="FFFFFF"/>
-                </a:solidFill>
-                <a:latin typeface="Century Gothic"/>
-              </a:rPr>
-              <a:t>assets</a:t>
-            </a:r>
-            <a:r>
-              <a:rPr lang="ru-RU" dirty="0">
-                <a:solidFill>
-                  <a:srgbClr val="FFFFFF"/>
-                </a:solidFill>
-                <a:latin typeface="Century Gothic"/>
-              </a:rPr>
-              <a:t> </a:t>
-            </a:r>
-            <a:r>
-              <a:rPr lang="ru-RU" dirty="0" err="1">
-                <a:solidFill>
-                  <a:srgbClr val="FFFFFF"/>
-                </a:solidFill>
-                <a:latin typeface="Century Gothic"/>
-              </a:rPr>
-              <a:t>representing</a:t>
-            </a:r>
-            <a:r>
-              <a:rPr lang="ru-RU" dirty="0">
-                <a:solidFill>
-                  <a:srgbClr val="FFFFFF"/>
-                </a:solidFill>
-                <a:latin typeface="Century Gothic"/>
-              </a:rPr>
-              <a:t> </a:t>
-            </a:r>
-            <a:r>
-              <a:rPr lang="ru-RU" dirty="0" err="1">
-                <a:solidFill>
-                  <a:srgbClr val="FFFFFF"/>
-                </a:solidFill>
-                <a:latin typeface="Century Gothic"/>
-              </a:rPr>
-              <a:t>those</a:t>
-            </a:r>
-            <a:r>
-              <a:rPr lang="ru-RU" dirty="0">
-                <a:solidFill>
-                  <a:srgbClr val="FFFFFF"/>
-                </a:solidFill>
-                <a:latin typeface="Century Gothic"/>
-              </a:rPr>
-              <a:t> </a:t>
-            </a:r>
-            <a:r>
-              <a:rPr lang="ru-RU" dirty="0" err="1">
-                <a:solidFill>
-                  <a:srgbClr val="FFFFFF"/>
-                </a:solidFill>
-                <a:latin typeface="Century Gothic"/>
-              </a:rPr>
-              <a:t>modules</a:t>
-            </a:r>
-          </a:p>
-        </p:txBody>
-      </p:sp>
-      <p:sp>
-        <p:nvSpPr>
-          <p:cNvPr id="8" name="TextBox 7"/>
-          <p:cNvSpPr txBox="1"/>
-          <p:nvPr/>
-        </p:nvSpPr>
-        <p:spPr>
-          <a:xfrm>
-            <a:off x="646111" y="2629619"/>
-            <a:ext cx="7034783" cy="584775"/>
-          </a:xfrm>
-          <a:prstGeom prst="rect">
-            <a:avLst/>
-          </a:prstGeom>
-        </p:spPr>
-        <p:txBody>
-          <a:bodyPr rtlCol="0">
-            <a:spAutoFit/>
-          </a:bodyPr>
-          <a:lstStyle/>
-          <a:p>
-            <a:r>
-              <a:rPr lang="ru-RU" sz="3200" dirty="0" err="1">
-                <a:solidFill>
-                  <a:srgbClr val="FFFFFF"/>
-                </a:solidFill>
-                <a:latin typeface="Century Gothic"/>
-                <a:cs typeface="Helvetica"/>
-              </a:rPr>
-              <a:t>How</a:t>
-            </a:r>
-            <a:r>
-              <a:rPr lang="ru-RU" sz="3200" dirty="0">
-                <a:solidFill>
-                  <a:srgbClr val="FFFFFF"/>
-                </a:solidFill>
-                <a:latin typeface="Century Gothic"/>
-                <a:cs typeface="Helvetica"/>
-              </a:rPr>
-              <a:t> </a:t>
-            </a:r>
-            <a:r>
-              <a:rPr lang="ru-RU" sz="3200" dirty="0" err="1">
-                <a:solidFill>
-                  <a:srgbClr val="FFFFFF"/>
-                </a:solidFill>
-                <a:latin typeface="Century Gothic"/>
-                <a:cs typeface="Helvetica"/>
-              </a:rPr>
-              <a:t>is</a:t>
-            </a:r>
-            <a:r>
-              <a:rPr lang="ru-RU" sz="3200" dirty="0">
-                <a:solidFill>
-                  <a:srgbClr val="FFFFFF"/>
-                </a:solidFill>
-                <a:latin typeface="Century Gothic"/>
-                <a:cs typeface="Helvetica"/>
-              </a:rPr>
-              <a:t> </a:t>
-            </a:r>
-            <a:r>
-              <a:rPr lang="ru-RU" sz="3200" dirty="0" err="1">
-                <a:solidFill>
-                  <a:srgbClr val="FFFFFF"/>
-                </a:solidFill>
-                <a:latin typeface="Century Gothic"/>
-                <a:cs typeface="Helvetica"/>
-              </a:rPr>
-              <a:t>webpack</a:t>
-            </a:r>
-            <a:r>
-              <a:rPr lang="ru-RU" sz="3200" dirty="0">
-                <a:solidFill>
-                  <a:srgbClr val="FFFFFF"/>
-                </a:solidFill>
-                <a:latin typeface="Century Gothic"/>
-                <a:cs typeface="Helvetica"/>
-              </a:rPr>
-              <a:t> </a:t>
-            </a:r>
-            <a:r>
-              <a:rPr lang="ru-RU" sz="3200" dirty="0" err="1">
-                <a:solidFill>
-                  <a:srgbClr val="FFFFFF"/>
-                </a:solidFill>
-                <a:latin typeface="Century Gothic"/>
-                <a:cs typeface="Helvetica"/>
-              </a:rPr>
-              <a:t>different</a:t>
-            </a:r>
-            <a:r>
-              <a:rPr lang="ru-RU" sz="3200" dirty="0">
-                <a:solidFill>
-                  <a:srgbClr val="FFFFFF"/>
-                </a:solidFill>
-                <a:latin typeface="Century Gothic"/>
-                <a:cs typeface="Helvetica"/>
-              </a:rPr>
-              <a:t>:</a:t>
-            </a:r>
-          </a:p>
-        </p:txBody>
-      </p:sp>
-      <p:sp>
-        <p:nvSpPr>
-          <p:cNvPr id="9" name="TextBox 8"/>
-          <p:cNvSpPr txBox="1"/>
-          <p:nvPr/>
-        </p:nvSpPr>
-        <p:spPr>
-          <a:xfrm>
-            <a:off x="1298575" y="3667125"/>
-            <a:ext cx="2743200" cy="1477328"/>
-          </a:xfrm>
-          <a:prstGeom prst="rect">
-            <a:avLst/>
-          </a:prstGeom>
-        </p:spPr>
-        <p:txBody>
-          <a:bodyPr rtlCol="0">
-            <a:spAutoFit/>
-          </a:bodyPr>
-          <a:lstStyle/>
-          <a:p>
-            <a:pPr marL="285750" indent="-285750">
-              <a:buFont typeface="Arial" panose="020B0604020202020204" pitchFamily="34" charset="0"/>
-              <a:buChar char="•"/>
-            </a:pPr>
-            <a:r>
-              <a:rPr lang="ru-RU" dirty="0" err="1">
-                <a:solidFill>
-                  <a:srgbClr val="FFFFFF"/>
-                </a:solidFill>
-                <a:latin typeface="Century Gothic"/>
-              </a:rPr>
-              <a:t>Code</a:t>
-            </a:r>
-            <a:r>
-              <a:rPr lang="ru-RU" dirty="0">
-                <a:solidFill>
-                  <a:srgbClr val="FFFFFF"/>
-                </a:solidFill>
-                <a:latin typeface="Century Gothic"/>
-              </a:rPr>
-              <a:t> </a:t>
-            </a:r>
-            <a:r>
-              <a:rPr lang="ru-RU" dirty="0" err="1">
-                <a:solidFill>
-                  <a:srgbClr val="FFFFFF"/>
-                </a:solidFill>
-                <a:latin typeface="Century Gothic"/>
-              </a:rPr>
-              <a:t>Splitting</a:t>
-            </a:r>
-            <a:endParaRPr lang="ru-RU" dirty="0" err="1">
-              <a:solidFill>
-                <a:srgbClr val="006A86"/>
-              </a:solidFill>
-              <a:latin typeface="Century Gothic"/>
-              <a:hlinkClick r:id="rId3"/>
-            </a:endParaRPr>
-          </a:p>
-          <a:p>
-            <a:pPr marL="285750" indent="-285750">
-              <a:buFont typeface="Arial" panose="020B0604020202020204" pitchFamily="34" charset="0"/>
-              <a:buChar char="•"/>
-            </a:pPr>
-            <a:r>
-              <a:rPr lang="ru-RU" dirty="0" err="1">
-                <a:solidFill>
-                  <a:srgbClr val="FFFFFF"/>
-                </a:solidFill>
-                <a:latin typeface="Century Gothic"/>
-              </a:rPr>
-              <a:t>Loaders</a:t>
-            </a:r>
-          </a:p>
-          <a:p>
-            <a:pPr marL="285750" indent="-285750">
-              <a:buFont typeface="Arial" panose="020B0604020202020204" pitchFamily="34" charset="0"/>
-              <a:buChar char="•"/>
-            </a:pPr>
-            <a:r>
-              <a:rPr lang="ru-RU" dirty="0" err="1">
-                <a:solidFill>
-                  <a:srgbClr val="FFFFFF"/>
-                </a:solidFill>
-                <a:latin typeface="Century Gothic"/>
-              </a:rPr>
-              <a:t>Clever</a:t>
-            </a:r>
-            <a:r>
-              <a:rPr lang="ru-RU" dirty="0">
-                <a:solidFill>
-                  <a:srgbClr val="FFFFFF"/>
-                </a:solidFill>
-                <a:latin typeface="Century Gothic"/>
-              </a:rPr>
-              <a:t> </a:t>
-            </a:r>
-            <a:r>
-              <a:rPr lang="ru-RU" dirty="0" err="1">
-                <a:solidFill>
-                  <a:srgbClr val="FFFFFF"/>
-                </a:solidFill>
-                <a:latin typeface="Century Gothic"/>
-              </a:rPr>
-              <a:t>parsing</a:t>
-            </a:r>
-          </a:p>
-          <a:p>
-            <a:pPr marL="285750" indent="-285750">
-              <a:buFont typeface="Arial" panose="020B0604020202020204" pitchFamily="34" charset="0"/>
-              <a:buChar char="•"/>
-            </a:pPr>
-            <a:r>
-              <a:rPr lang="ru-RU" dirty="0" err="1">
-                <a:solidFill>
-                  <a:srgbClr val="FFFFFF"/>
-                </a:solidFill>
-                <a:latin typeface="Century Gothic"/>
-              </a:rPr>
-              <a:t>Plugin</a:t>
-            </a:r>
-            <a:r>
-              <a:rPr lang="ru-RU" dirty="0">
-                <a:solidFill>
-                  <a:srgbClr val="FFFFFF"/>
-                </a:solidFill>
-                <a:latin typeface="Century Gothic"/>
-              </a:rPr>
-              <a:t> </a:t>
-            </a:r>
-            <a:r>
-              <a:rPr lang="ru-RU" dirty="0" err="1">
-                <a:solidFill>
-                  <a:srgbClr val="FFFFFF"/>
-                </a:solidFill>
-                <a:latin typeface="Century Gothic"/>
-              </a:rPr>
-              <a:t>system</a:t>
-            </a:r>
-          </a:p>
-          <a:p>
-            <a:endParaRPr lang="ru-RU" dirty="0">
-              <a:solidFill>
-                <a:srgbClr val="FFFFFF"/>
-              </a:solidFill>
-              <a:latin typeface="Century Gothic"/>
-            </a:endParaRPr>
-          </a:p>
-        </p:txBody>
-      </p:sp>
-    </p:spTree>
-    <p:extLst>
-      <p:ext uri="{BB962C8B-B14F-4D97-AF65-F5344CB8AC3E}">
-        <p14:creationId xmlns:p14="http://schemas.microsoft.com/office/powerpoint/2010/main" val="396840957"/>
       </p:ext>
     </p:extLst>
   </p:cSld>

</xml_diff>

<commit_message>
webpack-presentation/feature: add slides with mergin css/sass to single file with mimification
</commit_message>
<xml_diff>
--- a/webpack-presentation.pptx
+++ b/webpack-presentation.pptx
@@ -5,7 +5,7 @@
     <p:sldMasterId id="2147483671" r:id="rId1"/>
   </p:sldMasterIdLst>
   <p:notesMasterIdLst>
-    <p:notesMasterId r:id="rId29"/>
+    <p:notesMasterId r:id="rId32"/>
   </p:notesMasterIdLst>
   <p:sldIdLst>
     <p:sldId id="256" r:id="rId2"/>
@@ -30,11 +30,14 @@
     <p:sldId id="279" r:id="rId21"/>
     <p:sldId id="281" r:id="rId22"/>
     <p:sldId id="282" r:id="rId23"/>
-    <p:sldId id="280" r:id="rId24"/>
-    <p:sldId id="283" r:id="rId25"/>
-    <p:sldId id="285" r:id="rId26"/>
-    <p:sldId id="284" r:id="rId27"/>
-    <p:sldId id="265" r:id="rId28"/>
+    <p:sldId id="286" r:id="rId24"/>
+    <p:sldId id="287" r:id="rId25"/>
+    <p:sldId id="288" r:id="rId26"/>
+    <p:sldId id="280" r:id="rId27"/>
+    <p:sldId id="283" r:id="rId28"/>
+    <p:sldId id="285" r:id="rId29"/>
+    <p:sldId id="284" r:id="rId30"/>
+    <p:sldId id="265" r:id="rId31"/>
   </p:sldIdLst>
   <p:sldSz cx="12192000" cy="6858000"/>
   <p:notesSz cx="6858000" cy="9144000"/>
@@ -2773,7 +2776,7 @@
           <a:p>
             <a:fld id="{CF7F067E-DC4F-4F5E-85B2-969017E33A3B}" type="slidenum">
               <a:rPr lang="ru-RU"/>
-              <a:t>23</a:t>
+              <a:t>‹#›</a:t>
             </a:fld>
             <a:endParaRPr lang="ru-RU"/>
           </a:p>
@@ -2782,7 +2785,7 @@
     </p:spTree>
     <p:extLst>
       <p:ext uri="{BB962C8B-B14F-4D97-AF65-F5344CB8AC3E}">
-        <p14:creationId xmlns:p14="http://schemas.microsoft.com/office/powerpoint/2010/main" val="2179646342"/>
+        <p14:creationId xmlns:p14="http://schemas.microsoft.com/office/powerpoint/2010/main" val="2117627801"/>
       </p:ext>
     </p:extLst>
   </p:cSld>
@@ -2836,38 +2839,7 @@
           <a:bodyPr/>
           <a:lstStyle/>
           <a:p>
-            <a:r>
-              <a:rPr lang="ru-RU" dirty="0"/>
-              <a:t>1) </a:t>
-            </a:r>
-            <a:r>
-              <a:rPr lang="ru-RU" dirty="0" err="1"/>
-              <a:t>Differences</a:t>
-            </a:r>
-            <a:r>
-              <a:rPr lang="ru-RU" dirty="0"/>
-              <a:t> </a:t>
-            </a:r>
-            <a:r>
-              <a:rPr lang="ru-RU" dirty="0" err="1"/>
-              <a:t>between</a:t>
-            </a:r>
-            <a:r>
-              <a:rPr lang="ru-RU" dirty="0"/>
-              <a:t> </a:t>
-            </a:r>
-            <a:r>
-              <a:rPr lang="ru-RU" dirty="0" err="1"/>
-              <a:t>css</a:t>
-            </a:r>
-            <a:r>
-              <a:rPr lang="ru-RU" dirty="0"/>
-              <a:t> </a:t>
-            </a:r>
-            <a:r>
-              <a:rPr lang="ru-RU" dirty="0" err="1"/>
-              <a:t>loaders</a:t>
-            </a:r>
+            <a:endParaRPr lang="ru-RU"/>
           </a:p>
         </p:txBody>
       </p:sp>
@@ -2888,7 +2860,7 @@
           <a:p>
             <a:fld id="{CF7F067E-DC4F-4F5E-85B2-969017E33A3B}" type="slidenum">
               <a:rPr lang="ru-RU"/>
-              <a:t>24</a:t>
+              <a:t>‹#›</a:t>
             </a:fld>
             <a:endParaRPr lang="ru-RU"/>
           </a:p>
@@ -2897,7 +2869,7 @@
     </p:spTree>
     <p:extLst>
       <p:ext uri="{BB962C8B-B14F-4D97-AF65-F5344CB8AC3E}">
-        <p14:creationId xmlns:p14="http://schemas.microsoft.com/office/powerpoint/2010/main" val="2658402405"/>
+        <p14:creationId xmlns:p14="http://schemas.microsoft.com/office/powerpoint/2010/main" val="487432254"/>
       </p:ext>
     </p:extLst>
   </p:cSld>
@@ -2951,130 +2923,7 @@
           <a:bodyPr/>
           <a:lstStyle/>
           <a:p>
-            <a:r>
-              <a:rPr lang="ru-RU" dirty="0"/>
-              <a:t>1) </a:t>
-            </a:r>
-            <a:r>
-              <a:rPr lang="ru-RU" dirty="0" err="1"/>
-              <a:t>built</a:t>
-            </a:r>
-            <a:r>
-              <a:rPr lang="ru-RU" dirty="0"/>
-              <a:t> </a:t>
-            </a:r>
-            <a:r>
-              <a:rPr lang="ru-RU" dirty="0" err="1"/>
-              <a:t>in</a:t>
-            </a:r>
-            <a:r>
-              <a:rPr lang="ru-RU" dirty="0"/>
-              <a:t> </a:t>
-            </a:r>
-            <a:r>
-              <a:rPr lang="ru-RU" dirty="0" err="1"/>
-              <a:t>modules</a:t>
-            </a:r>
-          </a:p>
-          <a:p>
-            <a:r>
-              <a:rPr lang="ru-RU" dirty="0"/>
-              <a:t>2) </a:t>
-            </a:r>
-            <a:r>
-              <a:rPr lang="ru-RU" dirty="0" err="1"/>
-              <a:t>second</a:t>
-            </a:r>
-            <a:r>
-              <a:rPr lang="ru-RU" dirty="0"/>
-              <a:t> </a:t>
-            </a:r>
-            <a:r>
-              <a:rPr lang="ru-RU" dirty="0" err="1"/>
-              <a:t>minimization</a:t>
-            </a:r>
-            <a:r>
-              <a:rPr lang="ru-RU" dirty="0"/>
-              <a:t> </a:t>
-            </a:r>
-            <a:r>
-              <a:rPr lang="ru-RU" dirty="0" err="1"/>
-              <a:t>type</a:t>
-            </a:r>
-            <a:r>
-              <a:rPr lang="ru-RU" dirty="0"/>
-              <a:t> (</a:t>
-            </a:r>
-            <a:r>
-              <a:rPr lang="ru-RU" dirty="0" err="1"/>
-              <a:t>modules</a:t>
-            </a:r>
-            <a:r>
-              <a:rPr lang="ru-RU" dirty="0"/>
-              <a:t> </a:t>
-            </a:r>
-            <a:r>
-              <a:rPr lang="ru-RU" dirty="0" err="1"/>
-              <a:t>options</a:t>
-            </a:r>
-            <a:r>
-              <a:rPr lang="ru-RU" dirty="0"/>
-              <a:t> </a:t>
-            </a:r>
-            <a:r>
-              <a:rPr lang="ru-RU" dirty="0" err="1"/>
-              <a:t>minimize</a:t>
-            </a:r>
-            <a:r>
-              <a:rPr lang="ru-RU" dirty="0"/>
-              <a:t>=</a:t>
-            </a:r>
-            <a:r>
-              <a:rPr lang="ru-RU" dirty="0" err="1"/>
-              <a:t>true</a:t>
-            </a:r>
-            <a:r>
-              <a:rPr lang="ru-RU" dirty="0"/>
-              <a:t> ) </a:t>
-            </a:r>
-          </a:p>
-          <a:p>
-            <a:r>
-              <a:rPr lang="ru-RU" dirty="0"/>
-              <a:t>3) </a:t>
-            </a:r>
-            <a:r>
-              <a:rPr lang="ru-RU" dirty="0" err="1"/>
-              <a:t>uglifyJs</a:t>
-            </a:r>
-            <a:r>
-              <a:rPr lang="ru-RU" dirty="0"/>
-              <a:t> </a:t>
-            </a:r>
-            <a:r>
-              <a:rPr lang="ru-RU" dirty="0" err="1"/>
-              <a:t>fon</a:t>
-            </a:r>
-            <a:r>
-              <a:rPr lang="ru-RU" dirty="0"/>
-              <a:t> </a:t>
-            </a:r>
-            <a:r>
-              <a:rPr lang="ru-RU" dirty="0" err="1"/>
-              <a:t>work</a:t>
-            </a:r>
-            <a:r>
-              <a:rPr lang="ru-RU" dirty="0"/>
-              <a:t> </a:t>
-            </a:r>
-            <a:r>
-              <a:rPr lang="ru-RU" dirty="0" err="1"/>
-              <a:t>with</a:t>
-            </a:r>
-            <a:r>
-              <a:rPr lang="ru-RU" dirty="0"/>
-              <a:t> ES6</a:t>
-            </a:r>
+            <a:endParaRPr lang="ru-RU"/>
           </a:p>
         </p:txBody>
       </p:sp>
@@ -3095,7 +2944,7 @@
           <a:p>
             <a:fld id="{CF7F067E-DC4F-4F5E-85B2-969017E33A3B}" type="slidenum">
               <a:rPr lang="ru-RU"/>
-              <a:t>25</a:t>
+              <a:t>‹#›</a:t>
             </a:fld>
             <a:endParaRPr lang="ru-RU"/>
           </a:p>
@@ -3104,7 +2953,7 @@
     </p:spTree>
     <p:extLst>
       <p:ext uri="{BB962C8B-B14F-4D97-AF65-F5344CB8AC3E}">
-        <p14:creationId xmlns:p14="http://schemas.microsoft.com/office/powerpoint/2010/main" val="994342092"/>
+        <p14:creationId xmlns:p14="http://schemas.microsoft.com/office/powerpoint/2010/main" val="1596277499"/>
       </p:ext>
     </p:extLst>
   </p:cSld>
@@ -3158,6 +3007,412 @@
           <a:bodyPr/>
           <a:lstStyle/>
           <a:p>
+            <a:endParaRPr lang="ru-RU"/>
+          </a:p>
+        </p:txBody>
+      </p:sp>
+      <p:sp>
+        <p:nvSpPr>
+          <p:cNvPr id="4" name="Номер слайда 3"/>
+          <p:cNvSpPr>
+            <a:spLocks noGrp="1"/>
+          </p:cNvSpPr>
+          <p:nvPr>
+            <p:ph type="sldNum" sz="quarter" idx="10"/>
+          </p:nvPr>
+        </p:nvSpPr>
+        <p:spPr/>
+        <p:txBody>
+          <a:bodyPr/>
+          <a:lstStyle/>
+          <a:p>
+            <a:fld id="{CF7F067E-DC4F-4F5E-85B2-969017E33A3B}" type="slidenum">
+              <a:rPr lang="ru-RU"/>
+              <a:t>23</a:t>
+            </a:fld>
+            <a:endParaRPr lang="ru-RU"/>
+          </a:p>
+        </p:txBody>
+      </p:sp>
+    </p:spTree>
+    <p:extLst>
+      <p:ext uri="{BB962C8B-B14F-4D97-AF65-F5344CB8AC3E}">
+        <p14:creationId xmlns:p14="http://schemas.microsoft.com/office/powerpoint/2010/main" val="2179646342"/>
+      </p:ext>
+    </p:extLst>
+  </p:cSld>
+  <p:clrMapOvr>
+    <a:masterClrMapping/>
+  </p:clrMapOvr>
+</p:notes>
+</file>
+
+<file path=ppt/notesSlides/notesSlide26.xml><?xml version="1.0" encoding="utf-8"?>
+<p:notes xmlns:a="http://schemas.openxmlformats.org/drawingml/2006/main" xmlns:r="http://schemas.openxmlformats.org/officeDocument/2006/relationships" xmlns:p="http://schemas.openxmlformats.org/presentationml/2006/main">
+  <p:cSld>
+    <p:spTree>
+      <p:nvGrpSpPr>
+        <p:cNvPr id="1" name=""/>
+        <p:cNvGrpSpPr/>
+        <p:nvPr/>
+      </p:nvGrpSpPr>
+      <p:grpSpPr>
+        <a:xfrm>
+          <a:off x="0" y="0"/>
+          <a:ext cx="0" cy="0"/>
+          <a:chOff x="0" y="0"/>
+          <a:chExt cx="0" cy="0"/>
+        </a:xfrm>
+      </p:grpSpPr>
+      <p:sp>
+        <p:nvSpPr>
+          <p:cNvPr id="2" name="Образ слайда 1"/>
+          <p:cNvSpPr>
+            <a:spLocks noGrp="1" noRot="1" noChangeAspect="1"/>
+          </p:cNvSpPr>
+          <p:nvPr>
+            <p:ph type="sldImg"/>
+          </p:nvPr>
+        </p:nvSpPr>
+        <p:spPr/>
+      </p:sp>
+      <p:sp>
+        <p:nvSpPr>
+          <p:cNvPr id="3" name="Заметки 2"/>
+          <p:cNvSpPr>
+            <a:spLocks noGrp="1"/>
+          </p:cNvSpPr>
+          <p:nvPr>
+            <p:ph type="body" idx="1"/>
+          </p:nvPr>
+        </p:nvSpPr>
+        <p:spPr/>
+        <p:txBody>
+          <a:bodyPr/>
+          <a:lstStyle/>
+          <a:p>
+            <a:r>
+              <a:rPr lang="ru-RU" dirty="0"/>
+              <a:t>1) </a:t>
+            </a:r>
+            <a:r>
+              <a:rPr lang="ru-RU" dirty="0" err="1"/>
+              <a:t>Differences</a:t>
+            </a:r>
+            <a:r>
+              <a:rPr lang="ru-RU" dirty="0"/>
+              <a:t> </a:t>
+            </a:r>
+            <a:r>
+              <a:rPr lang="ru-RU" dirty="0" err="1"/>
+              <a:t>between</a:t>
+            </a:r>
+            <a:r>
+              <a:rPr lang="ru-RU" dirty="0"/>
+              <a:t> </a:t>
+            </a:r>
+            <a:r>
+              <a:rPr lang="ru-RU" dirty="0" err="1"/>
+              <a:t>css</a:t>
+            </a:r>
+            <a:r>
+              <a:rPr lang="ru-RU" dirty="0"/>
+              <a:t> </a:t>
+            </a:r>
+            <a:r>
+              <a:rPr lang="ru-RU" dirty="0" err="1"/>
+              <a:t>loaders</a:t>
+            </a:r>
+          </a:p>
+        </p:txBody>
+      </p:sp>
+      <p:sp>
+        <p:nvSpPr>
+          <p:cNvPr id="4" name="Номер слайда 3"/>
+          <p:cNvSpPr>
+            <a:spLocks noGrp="1"/>
+          </p:cNvSpPr>
+          <p:nvPr>
+            <p:ph type="sldNum" sz="quarter" idx="10"/>
+          </p:nvPr>
+        </p:nvSpPr>
+        <p:spPr/>
+        <p:txBody>
+          <a:bodyPr/>
+          <a:lstStyle/>
+          <a:p>
+            <a:fld id="{CF7F067E-DC4F-4F5E-85B2-969017E33A3B}" type="slidenum">
+              <a:rPr lang="ru-RU"/>
+              <a:t>24</a:t>
+            </a:fld>
+            <a:endParaRPr lang="ru-RU"/>
+          </a:p>
+        </p:txBody>
+      </p:sp>
+    </p:spTree>
+    <p:extLst>
+      <p:ext uri="{BB962C8B-B14F-4D97-AF65-F5344CB8AC3E}">
+        <p14:creationId xmlns:p14="http://schemas.microsoft.com/office/powerpoint/2010/main" val="2658402405"/>
+      </p:ext>
+    </p:extLst>
+  </p:cSld>
+  <p:clrMapOvr>
+    <a:masterClrMapping/>
+  </p:clrMapOvr>
+</p:notes>
+</file>
+
+<file path=ppt/notesSlides/notesSlide27.xml><?xml version="1.0" encoding="utf-8"?>
+<p:notes xmlns:a="http://schemas.openxmlformats.org/drawingml/2006/main" xmlns:r="http://schemas.openxmlformats.org/officeDocument/2006/relationships" xmlns:p="http://schemas.openxmlformats.org/presentationml/2006/main">
+  <p:cSld>
+    <p:spTree>
+      <p:nvGrpSpPr>
+        <p:cNvPr id="1" name=""/>
+        <p:cNvGrpSpPr/>
+        <p:nvPr/>
+      </p:nvGrpSpPr>
+      <p:grpSpPr>
+        <a:xfrm>
+          <a:off x="0" y="0"/>
+          <a:ext cx="0" cy="0"/>
+          <a:chOff x="0" y="0"/>
+          <a:chExt cx="0" cy="0"/>
+        </a:xfrm>
+      </p:grpSpPr>
+      <p:sp>
+        <p:nvSpPr>
+          <p:cNvPr id="2" name="Образ слайда 1"/>
+          <p:cNvSpPr>
+            <a:spLocks noGrp="1" noRot="1" noChangeAspect="1"/>
+          </p:cNvSpPr>
+          <p:nvPr>
+            <p:ph type="sldImg"/>
+          </p:nvPr>
+        </p:nvSpPr>
+        <p:spPr/>
+      </p:sp>
+      <p:sp>
+        <p:nvSpPr>
+          <p:cNvPr id="3" name="Заметки 2"/>
+          <p:cNvSpPr>
+            <a:spLocks noGrp="1"/>
+          </p:cNvSpPr>
+          <p:nvPr>
+            <p:ph type="body" idx="1"/>
+          </p:nvPr>
+        </p:nvSpPr>
+        <p:spPr/>
+        <p:txBody>
+          <a:bodyPr/>
+          <a:lstStyle/>
+          <a:p>
+            <a:r>
+              <a:rPr lang="ru-RU" dirty="0"/>
+              <a:t>1) </a:t>
+            </a:r>
+            <a:r>
+              <a:rPr lang="ru-RU" dirty="0" err="1"/>
+              <a:t>built</a:t>
+            </a:r>
+            <a:r>
+              <a:rPr lang="ru-RU" dirty="0"/>
+              <a:t> </a:t>
+            </a:r>
+            <a:r>
+              <a:rPr lang="ru-RU" dirty="0" err="1"/>
+              <a:t>in</a:t>
+            </a:r>
+            <a:r>
+              <a:rPr lang="ru-RU" dirty="0"/>
+              <a:t> </a:t>
+            </a:r>
+            <a:r>
+              <a:rPr lang="ru-RU" dirty="0" err="1"/>
+              <a:t>modules</a:t>
+            </a:r>
+          </a:p>
+          <a:p>
+            <a:r>
+              <a:rPr lang="ru-RU" dirty="0"/>
+              <a:t>2) </a:t>
+            </a:r>
+            <a:r>
+              <a:rPr lang="ru-RU" dirty="0" err="1"/>
+              <a:t>second</a:t>
+            </a:r>
+            <a:r>
+              <a:rPr lang="ru-RU" dirty="0"/>
+              <a:t> </a:t>
+            </a:r>
+            <a:r>
+              <a:rPr lang="ru-RU" dirty="0" err="1"/>
+              <a:t>minimization</a:t>
+            </a:r>
+            <a:r>
+              <a:rPr lang="ru-RU" dirty="0"/>
+              <a:t> </a:t>
+            </a:r>
+            <a:r>
+              <a:rPr lang="ru-RU" dirty="0" err="1"/>
+              <a:t>type</a:t>
+            </a:r>
+            <a:r>
+              <a:rPr lang="ru-RU" dirty="0"/>
+              <a:t> (</a:t>
+            </a:r>
+            <a:r>
+              <a:rPr lang="ru-RU" dirty="0" err="1"/>
+              <a:t>modules</a:t>
+            </a:r>
+            <a:r>
+              <a:rPr lang="ru-RU" dirty="0"/>
+              <a:t> </a:t>
+            </a:r>
+            <a:r>
+              <a:rPr lang="ru-RU" dirty="0" err="1"/>
+              <a:t>options</a:t>
+            </a:r>
+            <a:r>
+              <a:rPr lang="ru-RU" dirty="0"/>
+              <a:t> </a:t>
+            </a:r>
+            <a:r>
+              <a:rPr lang="ru-RU" dirty="0" err="1"/>
+              <a:t>minimize</a:t>
+            </a:r>
+            <a:r>
+              <a:rPr lang="ru-RU" dirty="0"/>
+              <a:t>=</a:t>
+            </a:r>
+            <a:r>
+              <a:rPr lang="ru-RU" dirty="0" err="1"/>
+              <a:t>true</a:t>
+            </a:r>
+            <a:r>
+              <a:rPr lang="ru-RU" dirty="0"/>
+              <a:t> ) </a:t>
+            </a:r>
+          </a:p>
+          <a:p>
+            <a:r>
+              <a:rPr lang="ru-RU" dirty="0"/>
+              <a:t>3) </a:t>
+            </a:r>
+            <a:r>
+              <a:rPr lang="ru-RU" dirty="0" err="1"/>
+              <a:t>uglifyJs</a:t>
+            </a:r>
+            <a:r>
+              <a:rPr lang="ru-RU" dirty="0"/>
+              <a:t> </a:t>
+            </a:r>
+            <a:r>
+              <a:rPr lang="ru-RU" dirty="0" err="1"/>
+              <a:t>fon</a:t>
+            </a:r>
+            <a:r>
+              <a:rPr lang="ru-RU" dirty="0"/>
+              <a:t> </a:t>
+            </a:r>
+            <a:r>
+              <a:rPr lang="ru-RU" dirty="0" err="1"/>
+              <a:t>work</a:t>
+            </a:r>
+            <a:r>
+              <a:rPr lang="ru-RU" dirty="0"/>
+              <a:t> </a:t>
+            </a:r>
+            <a:r>
+              <a:rPr lang="ru-RU" dirty="0" err="1"/>
+              <a:t>with</a:t>
+            </a:r>
+            <a:r>
+              <a:rPr lang="ru-RU" dirty="0"/>
+              <a:t> ES6</a:t>
+            </a:r>
+          </a:p>
+        </p:txBody>
+      </p:sp>
+      <p:sp>
+        <p:nvSpPr>
+          <p:cNvPr id="4" name="Номер слайда 3"/>
+          <p:cNvSpPr>
+            <a:spLocks noGrp="1"/>
+          </p:cNvSpPr>
+          <p:nvPr>
+            <p:ph type="sldNum" sz="quarter" idx="10"/>
+          </p:nvPr>
+        </p:nvSpPr>
+        <p:spPr/>
+        <p:txBody>
+          <a:bodyPr/>
+          <a:lstStyle/>
+          <a:p>
+            <a:fld id="{CF7F067E-DC4F-4F5E-85B2-969017E33A3B}" type="slidenum">
+              <a:rPr lang="ru-RU"/>
+              <a:t>25</a:t>
+            </a:fld>
+            <a:endParaRPr lang="ru-RU"/>
+          </a:p>
+        </p:txBody>
+      </p:sp>
+    </p:spTree>
+    <p:extLst>
+      <p:ext uri="{BB962C8B-B14F-4D97-AF65-F5344CB8AC3E}">
+        <p14:creationId xmlns:p14="http://schemas.microsoft.com/office/powerpoint/2010/main" val="994342092"/>
+      </p:ext>
+    </p:extLst>
+  </p:cSld>
+  <p:clrMapOvr>
+    <a:masterClrMapping/>
+  </p:clrMapOvr>
+</p:notes>
+</file>
+
+<file path=ppt/notesSlides/notesSlide28.xml><?xml version="1.0" encoding="utf-8"?>
+<p:notes xmlns:a="http://schemas.openxmlformats.org/drawingml/2006/main" xmlns:r="http://schemas.openxmlformats.org/officeDocument/2006/relationships" xmlns:p="http://schemas.openxmlformats.org/presentationml/2006/main">
+  <p:cSld>
+    <p:spTree>
+      <p:nvGrpSpPr>
+        <p:cNvPr id="1" name=""/>
+        <p:cNvGrpSpPr/>
+        <p:nvPr/>
+      </p:nvGrpSpPr>
+      <p:grpSpPr>
+        <a:xfrm>
+          <a:off x="0" y="0"/>
+          <a:ext cx="0" cy="0"/>
+          <a:chOff x="0" y="0"/>
+          <a:chExt cx="0" cy="0"/>
+        </a:xfrm>
+      </p:grpSpPr>
+      <p:sp>
+        <p:nvSpPr>
+          <p:cNvPr id="2" name="Образ слайда 1"/>
+          <p:cNvSpPr>
+            <a:spLocks noGrp="1" noRot="1" noChangeAspect="1"/>
+          </p:cNvSpPr>
+          <p:nvPr>
+            <p:ph type="sldImg"/>
+          </p:nvPr>
+        </p:nvSpPr>
+        <p:spPr/>
+      </p:sp>
+      <p:sp>
+        <p:nvSpPr>
+          <p:cNvPr id="3" name="Заметки 2"/>
+          <p:cNvSpPr>
+            <a:spLocks noGrp="1"/>
+          </p:cNvSpPr>
+          <p:nvPr>
+            <p:ph type="body" idx="1"/>
+          </p:nvPr>
+        </p:nvSpPr>
+        <p:spPr/>
+        <p:txBody>
+          <a:bodyPr/>
+          <a:lstStyle/>
+          <a:p>
             <a:r>
               <a:rPr lang="ru-RU" dirty="0"/>
               <a:t>1)</a:t>
@@ -3213,7 +3468,7 @@
 </p:notes>
 </file>
 
-<file path=ppt/notesSlides/notesSlide26.xml><?xml version="1.0" encoding="utf-8"?>
+<file path=ppt/notesSlides/notesSlide29.xml><?xml version="1.0" encoding="utf-8"?>
 <p:notes xmlns:a="http://schemas.openxmlformats.org/drawingml/2006/main" xmlns:r="http://schemas.openxmlformats.org/officeDocument/2006/relationships" xmlns:p="http://schemas.openxmlformats.org/presentationml/2006/main">
   <p:cSld>
     <p:spTree>
@@ -3655,7 +3910,7 @@
           <a:p>
             <a:fld id="{CF7F067E-DC4F-4F5E-85B2-969017E33A3B}" type="slidenum">
               <a:rPr lang="ru-RU"/>
-              <a:t>6</a:t>
+              <a:t>5</a:t>
             </a:fld>
             <a:endParaRPr lang="ru-RU"/>
           </a:p>
@@ -3754,7 +4009,7 @@
           <a:p>
             <a:fld id="{CF7F067E-DC4F-4F5E-85B2-969017E33A3B}" type="slidenum">
               <a:rPr lang="ru-RU"/>
-              <a:t>5</a:t>
+              <a:t>6</a:t>
             </a:fld>
             <a:endParaRPr lang="ru-RU"/>
           </a:p>
@@ -12789,6 +13044,359 @@
           <a:lstStyle/>
           <a:p>
             <a:r>
+              <a:rPr lang="ru-RU" dirty="0"/>
+              <a:t>CSS </a:t>
+            </a:r>
+            <a:r>
+              <a:rPr lang="ru-RU" dirty="0" err="1"/>
+              <a:t>to</a:t>
+            </a:r>
+            <a:r>
+              <a:rPr lang="ru-RU" dirty="0"/>
+              <a:t> </a:t>
+            </a:r>
+            <a:r>
+              <a:rPr lang="ru-RU" dirty="0" err="1"/>
+              <a:t>single</a:t>
+            </a:r>
+            <a:r>
+              <a:rPr lang="ru-RU" dirty="0"/>
+              <a:t> </a:t>
+            </a:r>
+            <a:r>
+              <a:rPr lang="ru-RU" dirty="0" err="1"/>
+              <a:t>file</a:t>
+            </a:r>
+            <a:r>
+              <a:rPr lang="ru-RU" dirty="0"/>
+              <a:t> </a:t>
+            </a:r>
+            <a:r>
+              <a:rPr lang="ru-RU" dirty="0" err="1"/>
+              <a:t>with</a:t>
+            </a:r>
+            <a:r>
+              <a:rPr lang="ru-RU" dirty="0"/>
+              <a:t> </a:t>
+            </a:r>
+            <a:r>
+              <a:rPr lang="ru-RU" dirty="0" err="1"/>
+              <a:t>minification</a:t>
+            </a:r>
+            <a:r>
+              <a:rPr lang="ru-RU" dirty="0"/>
+              <a:t> </a:t>
+            </a:r>
+          </a:p>
+        </p:txBody>
+      </p:sp>
+      <p:pic>
+        <p:nvPicPr>
+          <p:cNvPr id="3" name="Рисунок 3" descr="Снимок экрана 2017-03-18 в 18.51.34.png"/>
+          <p:cNvPicPr>
+            <a:picLocks noChangeAspect="1"/>
+          </p:cNvPicPr>
+          <p:nvPr/>
+        </p:nvPicPr>
+        <p:blipFill>
+          <a:blip r:embed="rId3"/>
+          <a:stretch>
+            <a:fillRect/>
+          </a:stretch>
+        </p:blipFill>
+        <p:spPr>
+          <a:xfrm>
+            <a:off x="1895475" y="1809750"/>
+            <a:ext cx="9288768" cy="388938"/>
+          </a:xfrm>
+          <a:prstGeom prst="rect">
+            <a:avLst/>
+          </a:prstGeom>
+        </p:spPr>
+      </p:pic>
+      <p:pic>
+        <p:nvPicPr>
+          <p:cNvPr id="5" name="Рисунок 5" descr="Снимок экрана 2017-03-18 в 18.50.14.png"/>
+          <p:cNvPicPr>
+            <a:picLocks noChangeAspect="1"/>
+          </p:cNvPicPr>
+          <p:nvPr/>
+        </p:nvPicPr>
+        <p:blipFill rotWithShape="1">
+          <a:blip r:embed="rId4"/>
+          <a:srcRect r="9348"/>
+          <a:stretch/>
+        </p:blipFill>
+        <p:spPr>
+          <a:xfrm>
+            <a:off x="1895475" y="2266950"/>
+            <a:ext cx="9329297" cy="424300"/>
+          </a:xfrm>
+          <a:prstGeom prst="rect">
+            <a:avLst/>
+          </a:prstGeom>
+        </p:spPr>
+      </p:pic>
+    </p:spTree>
+    <p:extLst>
+      <p:ext uri="{BB962C8B-B14F-4D97-AF65-F5344CB8AC3E}">
+        <p14:creationId xmlns:p14="http://schemas.microsoft.com/office/powerpoint/2010/main" val="1860916918"/>
+      </p:ext>
+    </p:extLst>
+  </p:cSld>
+  <p:clrMapOvr>
+    <a:masterClrMapping/>
+  </p:clrMapOvr>
+</p:sld>
+</file>
+
+<file path=ppt/slides/slide24.xml><?xml version="1.0" encoding="utf-8"?>
+<p:sld xmlns:a="http://schemas.openxmlformats.org/drawingml/2006/main" xmlns:r="http://schemas.openxmlformats.org/officeDocument/2006/relationships" xmlns:p="http://schemas.openxmlformats.org/presentationml/2006/main">
+  <p:cSld>
+    <p:spTree>
+      <p:nvGrpSpPr>
+        <p:cNvPr id="1" name=""/>
+        <p:cNvGrpSpPr/>
+        <p:nvPr/>
+      </p:nvGrpSpPr>
+      <p:grpSpPr>
+        <a:xfrm>
+          <a:off x="0" y="0"/>
+          <a:ext cx="0" cy="0"/>
+          <a:chOff x="0" y="0"/>
+          <a:chExt cx="0" cy="0"/>
+        </a:xfrm>
+      </p:grpSpPr>
+      <p:sp>
+        <p:nvSpPr>
+          <p:cNvPr id="2" name="Заголовок 1"/>
+          <p:cNvSpPr>
+            <a:spLocks noGrp="1"/>
+          </p:cNvSpPr>
+          <p:nvPr>
+            <p:ph type="title"/>
+          </p:nvPr>
+        </p:nvSpPr>
+        <p:spPr/>
+        <p:txBody>
+          <a:bodyPr/>
+          <a:lstStyle/>
+          <a:p>
+            <a:r>
+              <a:rPr lang="ru-RU" dirty="0" err="1"/>
+              <a:t>Webpack</a:t>
+            </a:r>
+            <a:r>
+              <a:rPr lang="ru-RU" dirty="0"/>
+              <a:t> </a:t>
+            </a:r>
+            <a:r>
+              <a:rPr lang="ru-RU" dirty="0" err="1"/>
+              <a:t>config</a:t>
+            </a:r>
+          </a:p>
+        </p:txBody>
+      </p:sp>
+      <p:pic>
+        <p:nvPicPr>
+          <p:cNvPr id="3" name="Рисунок 3" descr="Снимок экрана 2017-03-18 в 18.55.09.png"/>
+          <p:cNvPicPr>
+            <a:picLocks noChangeAspect="1"/>
+          </p:cNvPicPr>
+          <p:nvPr/>
+        </p:nvPicPr>
+        <p:blipFill>
+          <a:blip r:embed="rId3"/>
+          <a:stretch>
+            <a:fillRect/>
+          </a:stretch>
+        </p:blipFill>
+        <p:spPr>
+          <a:xfrm>
+            <a:off x="2171700" y="1666875"/>
+            <a:ext cx="7307828" cy="1059374"/>
+          </a:xfrm>
+          <a:prstGeom prst="rect">
+            <a:avLst/>
+          </a:prstGeom>
+        </p:spPr>
+      </p:pic>
+      <p:pic>
+        <p:nvPicPr>
+          <p:cNvPr id="5" name="Рисунок 5" descr="Снимок экрана 2017-03-18 в 18.55.02.png"/>
+          <p:cNvPicPr>
+            <a:picLocks noChangeAspect="1"/>
+          </p:cNvPicPr>
+          <p:nvPr/>
+        </p:nvPicPr>
+        <p:blipFill>
+          <a:blip r:embed="rId4"/>
+          <a:stretch>
+            <a:fillRect/>
+          </a:stretch>
+        </p:blipFill>
+        <p:spPr>
+          <a:xfrm>
+            <a:off x="2343150" y="2914650"/>
+            <a:ext cx="6474075" cy="3581037"/>
+          </a:xfrm>
+          <a:prstGeom prst="rect">
+            <a:avLst/>
+          </a:prstGeom>
+        </p:spPr>
+      </p:pic>
+    </p:spTree>
+    <p:extLst>
+      <p:ext uri="{BB962C8B-B14F-4D97-AF65-F5344CB8AC3E}">
+        <p14:creationId xmlns:p14="http://schemas.microsoft.com/office/powerpoint/2010/main" val="2439316180"/>
+      </p:ext>
+    </p:extLst>
+  </p:cSld>
+  <p:clrMapOvr>
+    <a:masterClrMapping/>
+  </p:clrMapOvr>
+</p:sld>
+</file>
+
+<file path=ppt/slides/slide25.xml><?xml version="1.0" encoding="utf-8"?>
+<p:sld xmlns:a="http://schemas.openxmlformats.org/drawingml/2006/main" xmlns:r="http://schemas.openxmlformats.org/officeDocument/2006/relationships" xmlns:p="http://schemas.openxmlformats.org/presentationml/2006/main">
+  <p:cSld>
+    <p:spTree>
+      <p:nvGrpSpPr>
+        <p:cNvPr id="1" name=""/>
+        <p:cNvGrpSpPr/>
+        <p:nvPr/>
+      </p:nvGrpSpPr>
+      <p:grpSpPr>
+        <a:xfrm>
+          <a:off x="0" y="0"/>
+          <a:ext cx="0" cy="0"/>
+          <a:chOff x="0" y="0"/>
+          <a:chExt cx="0" cy="0"/>
+        </a:xfrm>
+      </p:grpSpPr>
+      <p:sp>
+        <p:nvSpPr>
+          <p:cNvPr id="2" name="Заголовок 1"/>
+          <p:cNvSpPr>
+            <a:spLocks noGrp="1"/>
+          </p:cNvSpPr>
+          <p:nvPr>
+            <p:ph type="title"/>
+          </p:nvPr>
+        </p:nvSpPr>
+        <p:spPr/>
+        <p:txBody>
+          <a:bodyPr/>
+          <a:lstStyle/>
+          <a:p>
+            <a:r>
+              <a:rPr lang="ru-RU" dirty="0" err="1"/>
+              <a:t>Result</a:t>
+            </a:r>
+            <a:endParaRPr lang="ru-RU" dirty="0" err="1">
+              <a:solidFill>
+                <a:srgbClr val="EBEBEB"/>
+              </a:solidFill>
+              <a:latin typeface="Century Gothic"/>
+            </a:endParaRPr>
+          </a:p>
+        </p:txBody>
+      </p:sp>
+      <p:pic>
+        <p:nvPicPr>
+          <p:cNvPr id="3" name="Рисунок 3" descr="Снимок экрана 2017-03-18 в 18.58.17.png"/>
+          <p:cNvPicPr>
+            <a:picLocks noChangeAspect="1"/>
+          </p:cNvPicPr>
+          <p:nvPr/>
+        </p:nvPicPr>
+        <p:blipFill>
+          <a:blip r:embed="rId3"/>
+          <a:stretch>
+            <a:fillRect/>
+          </a:stretch>
+        </p:blipFill>
+        <p:spPr>
+          <a:xfrm>
+            <a:off x="1190625" y="2124075"/>
+            <a:ext cx="3052816" cy="4257068"/>
+          </a:xfrm>
+          <a:prstGeom prst="rect">
+            <a:avLst/>
+          </a:prstGeom>
+        </p:spPr>
+      </p:pic>
+      <p:pic>
+        <p:nvPicPr>
+          <p:cNvPr id="9" name="Рисунок 9" descr="Снимок экрана 2017-03-18 в 18.59.56.png"/>
+          <p:cNvPicPr>
+            <a:picLocks noChangeAspect="1"/>
+          </p:cNvPicPr>
+          <p:nvPr/>
+        </p:nvPicPr>
+        <p:blipFill>
+          <a:blip r:embed="rId4"/>
+          <a:stretch>
+            <a:fillRect/>
+          </a:stretch>
+        </p:blipFill>
+        <p:spPr>
+          <a:xfrm>
+            <a:off x="1190625" y="1390650"/>
+            <a:ext cx="9543920" cy="505283"/>
+          </a:xfrm>
+          <a:prstGeom prst="rect">
+            <a:avLst/>
+          </a:prstGeom>
+        </p:spPr>
+      </p:pic>
+    </p:spTree>
+    <p:extLst>
+      <p:ext uri="{BB962C8B-B14F-4D97-AF65-F5344CB8AC3E}">
+        <p14:creationId xmlns:p14="http://schemas.microsoft.com/office/powerpoint/2010/main" val="4014283725"/>
+      </p:ext>
+    </p:extLst>
+  </p:cSld>
+  <p:clrMapOvr>
+    <a:masterClrMapping/>
+  </p:clrMapOvr>
+</p:sld>
+</file>
+
+<file path=ppt/slides/slide26.xml><?xml version="1.0" encoding="utf-8"?>
+<p:sld xmlns:a="http://schemas.openxmlformats.org/drawingml/2006/main" xmlns:r="http://schemas.openxmlformats.org/officeDocument/2006/relationships" xmlns:p="http://schemas.openxmlformats.org/presentationml/2006/main">
+  <p:cSld>
+    <p:spTree>
+      <p:nvGrpSpPr>
+        <p:cNvPr id="1" name=""/>
+        <p:cNvGrpSpPr/>
+        <p:nvPr/>
+      </p:nvGrpSpPr>
+      <p:grpSpPr>
+        <a:xfrm>
+          <a:off x="0" y="0"/>
+          <a:ext cx="0" cy="0"/>
+          <a:chOff x="0" y="0"/>
+          <a:chExt cx="0" cy="0"/>
+        </a:xfrm>
+      </p:grpSpPr>
+      <p:sp>
+        <p:nvSpPr>
+          <p:cNvPr id="2" name="Заголовок 1"/>
+          <p:cNvSpPr>
+            <a:spLocks noGrp="1"/>
+          </p:cNvSpPr>
+          <p:nvPr>
+            <p:ph type="title"/>
+          </p:nvPr>
+        </p:nvSpPr>
+        <p:spPr/>
+        <p:txBody>
+          <a:bodyPr/>
+          <a:lstStyle/>
+          <a:p>
+            <a:r>
               <a:rPr lang="ru-RU" dirty="0">
                 <a:latin typeface="Century Gothic"/>
               </a:rPr>
@@ -12939,7 +13547,7 @@
 </p:sld>
 </file>
 
-<file path=ppt/slides/slide24.xml><?xml version="1.0" encoding="utf-8"?>
+<file path=ppt/slides/slide27.xml><?xml version="1.0" encoding="utf-8"?>
 <p:sld xmlns:a="http://schemas.openxmlformats.org/drawingml/2006/main" xmlns:r="http://schemas.openxmlformats.org/officeDocument/2006/relationships" xmlns:p="http://schemas.openxmlformats.org/presentationml/2006/main">
   <p:cSld>
     <p:spTree>
@@ -13041,7 +13649,7 @@
 </p:sld>
 </file>
 
-<file path=ppt/slides/slide25.xml><?xml version="1.0" encoding="utf-8"?>
+<file path=ppt/slides/slide28.xml><?xml version="1.0" encoding="utf-8"?>
 <p:sld xmlns:a="http://schemas.openxmlformats.org/drawingml/2006/main" xmlns:r="http://schemas.openxmlformats.org/officeDocument/2006/relationships" xmlns:p="http://schemas.openxmlformats.org/presentationml/2006/main">
   <p:cSld>
     <p:spTree>
@@ -13314,7 +13922,7 @@
 </p:sld>
 </file>
 
-<file path=ppt/slides/slide26.xml><?xml version="1.0" encoding="utf-8"?>
+<file path=ppt/slides/slide29.xml><?xml version="1.0" encoding="utf-8"?>
 <p:sld xmlns:a="http://schemas.openxmlformats.org/drawingml/2006/main" xmlns:r="http://schemas.openxmlformats.org/officeDocument/2006/relationships" xmlns:p="http://schemas.openxmlformats.org/presentationml/2006/main">
   <p:cSld>
     <p:spTree>
@@ -13333,7 +13941,7 @@
       </p:grpSpPr>
       <p:pic>
         <p:nvPicPr>
-          <p:cNvPr id="2" name="Рисунок 2" descr="Снимок экрана 2017-03-18 в 16.19.53.png"/>
+          <p:cNvPr id="3" name="Рисунок 4" descr="Снимок экрана 2017-03-18 в 19.00.32.png"/>
           <p:cNvPicPr>
             <a:picLocks noChangeAspect="1"/>
           </p:cNvPicPr>
@@ -13347,8 +13955,8 @@
         </p:blipFill>
         <p:spPr>
           <a:xfrm>
-            <a:off x="847725" y="1209675"/>
-            <a:ext cx="5468111" cy="5092146"/>
+            <a:off x="1066800" y="1252627"/>
+            <a:ext cx="5058734" cy="5005785"/>
           </a:xfrm>
           <a:prstGeom prst="rect">
             <a:avLst/>
@@ -13357,7 +13965,7 @@
       </p:pic>
       <p:pic>
         <p:nvPicPr>
-          <p:cNvPr id="4" name="Рисунок 4" descr="Снимок экрана 2017-03-18 в 16.20.12.png"/>
+          <p:cNvPr id="6" name="Рисунок 6" descr="Снимок экрана 2017-03-18 в 19.01.37.png"/>
           <p:cNvPicPr>
             <a:picLocks noChangeAspect="1"/>
           </p:cNvPicPr>
@@ -13371,8 +13979,8 @@
         </p:blipFill>
         <p:spPr>
           <a:xfrm>
-            <a:off x="6648450" y="1238250"/>
-            <a:ext cx="5084063" cy="5034152"/>
+            <a:off x="6657975" y="1252538"/>
+            <a:ext cx="4777270" cy="5049019"/>
           </a:xfrm>
           <a:prstGeom prst="rect">
             <a:avLst/>
@@ -13383,283 +13991,6 @@
     <p:extLst>
       <p:ext uri="{BB962C8B-B14F-4D97-AF65-F5344CB8AC3E}">
         <p14:creationId xmlns:p14="http://schemas.microsoft.com/office/powerpoint/2010/main" val="1290554968"/>
-      </p:ext>
-    </p:extLst>
-  </p:cSld>
-  <p:clrMapOvr>
-    <a:masterClrMapping/>
-  </p:clrMapOvr>
-</p:sld>
-</file>
-
-<file path=ppt/slides/slide27.xml><?xml version="1.0" encoding="utf-8"?>
-<p:sld xmlns:a="http://schemas.openxmlformats.org/drawingml/2006/main" xmlns:r="http://schemas.openxmlformats.org/officeDocument/2006/relationships" xmlns:p="http://schemas.openxmlformats.org/presentationml/2006/main">
-  <p:cSld>
-    <p:spTree>
-      <p:nvGrpSpPr>
-        <p:cNvPr id="1" name=""/>
-        <p:cNvGrpSpPr/>
-        <p:nvPr/>
-      </p:nvGrpSpPr>
-      <p:grpSpPr>
-        <a:xfrm>
-          <a:off x="0" y="0"/>
-          <a:ext cx="0" cy="0"/>
-          <a:chOff x="0" y="0"/>
-          <a:chExt cx="0" cy="0"/>
-        </a:xfrm>
-      </p:grpSpPr>
-      <p:sp>
-        <p:nvSpPr>
-          <p:cNvPr id="2" name="Заголовок 1"/>
-          <p:cNvSpPr>
-            <a:spLocks noGrp="1"/>
-          </p:cNvSpPr>
-          <p:nvPr>
-            <p:ph type="title"/>
-          </p:nvPr>
-        </p:nvSpPr>
-        <p:spPr/>
-        <p:txBody>
-          <a:bodyPr/>
-          <a:lstStyle/>
-          <a:p>
-            <a:r>
-              <a:rPr lang="ru-RU" dirty="0" err="1"/>
-              <a:t>Links</a:t>
-            </a:r>
-          </a:p>
-        </p:txBody>
-      </p:sp>
-      <p:sp>
-        <p:nvSpPr>
-          <p:cNvPr id="3" name="Объект 2"/>
-          <p:cNvSpPr>
-            <a:spLocks noGrp="1"/>
-          </p:cNvSpPr>
-          <p:nvPr>
-            <p:ph idx="1"/>
-          </p:nvPr>
-        </p:nvSpPr>
-        <p:spPr>
-          <a:xfrm>
-            <a:off x="1103313" y="2052638"/>
-            <a:ext cx="10574782" cy="4195762"/>
-          </a:xfrm>
-        </p:spPr>
-        <p:txBody>
-          <a:bodyPr vert="horz" lIns="91440" tIns="45720" rIns="91440" bIns="45720" rtlCol="0" anchor="t">
-            <a:normAutofit/>
-          </a:bodyPr>
-          <a:lstStyle/>
-          <a:p>
-            <a:r>
-              <a:rPr lang="ru-RU" dirty="0">
-                <a:hlinkClick r:id="rId3"/>
-              </a:rPr>
-              <a:t>http://webpack.github.io/</a:t>
-            </a:r>
-          </a:p>
-          <a:p>
-            <a:r>
-              <a:rPr lang="ru-RU" dirty="0">
-                <a:solidFill>
-                  <a:srgbClr val="006A86"/>
-                </a:solidFill>
-                <a:latin typeface="Century Gothic"/>
-                <a:hlinkClick r:id="rId4"/>
-              </a:rPr>
-              <a:t>webpack</a:t>
-            </a:r>
-            <a:r>
-              <a:rPr lang="ru-RU" dirty="0">
-                <a:solidFill>
-                  <a:srgbClr val="006A86"/>
-                </a:solidFill>
-                <a:latin typeface="Helvetica"/>
-                <a:hlinkClick r:id="rId5"/>
-              </a:rPr>
-              <a:t>.js.org</a:t>
-            </a:r>
-            <a:r>
-              <a:rPr lang="ru-RU" dirty="0">
-                <a:latin typeface="Helvetica"/>
-              </a:rPr>
-              <a:t>  </a:t>
-            </a:r>
-            <a:r>
-              <a:rPr lang="ru-RU" dirty="0" err="1">
-                <a:latin typeface="Helvetica"/>
-              </a:rPr>
-              <a:t>Webpack</a:t>
-            </a:r>
-            <a:r>
-              <a:rPr lang="ru-RU" dirty="0">
-                <a:latin typeface="Helvetica"/>
-              </a:rPr>
-              <a:t> 2.x </a:t>
-            </a:r>
-            <a:r>
-              <a:rPr lang="ru-RU" dirty="0" err="1">
-                <a:latin typeface="Helvetica"/>
-              </a:rPr>
-              <a:t>official</a:t>
-            </a:r>
-            <a:r>
-              <a:rPr lang="ru-RU" dirty="0">
-                <a:latin typeface="Helvetica"/>
-              </a:rPr>
-              <a:t> </a:t>
-            </a:r>
-            <a:r>
-              <a:rPr lang="ru-RU" dirty="0" err="1">
-                <a:latin typeface="Helvetica"/>
-              </a:rPr>
-              <a:t>web</a:t>
-            </a:r>
-            <a:r>
-              <a:rPr lang="ru-RU" dirty="0">
-                <a:latin typeface="Helvetica"/>
-              </a:rPr>
-              <a:t> </a:t>
-            </a:r>
-            <a:r>
-              <a:rPr lang="ru-RU" dirty="0" err="1">
-                <a:latin typeface="Helvetica"/>
-              </a:rPr>
-              <a:t>site</a:t>
-            </a:r>
-          </a:p>
-          <a:p>
-            <a:r>
-              <a:rPr lang="ru-RU" dirty="0" err="1">
-                <a:latin typeface="Helvetica"/>
-              </a:rPr>
-              <a:t>Youtube</a:t>
-            </a:r>
-            <a:r>
-              <a:rPr lang="ru-RU" dirty="0">
-                <a:latin typeface="Helvetica"/>
-              </a:rPr>
-              <a:t>: </a:t>
-            </a:r>
-            <a:r>
-              <a:rPr lang="ru-RU" dirty="0" err="1">
-                <a:latin typeface="Helvetica"/>
-              </a:rPr>
-              <a:t>The</a:t>
-            </a:r>
-            <a:r>
-              <a:rPr lang="ru-RU" dirty="0">
-                <a:latin typeface="Helvetica"/>
-              </a:rPr>
-              <a:t> </a:t>
-            </a:r>
-            <a:r>
-              <a:rPr lang="ru-RU" dirty="0" err="1">
-                <a:latin typeface="Helvetica"/>
-              </a:rPr>
-              <a:t>net</a:t>
-            </a:r>
-            <a:r>
-              <a:rPr lang="ru-RU" dirty="0">
-                <a:latin typeface="Helvetica"/>
-              </a:rPr>
-              <a:t> </a:t>
-            </a:r>
-            <a:r>
-              <a:rPr lang="ru-RU" dirty="0" err="1">
-                <a:latin typeface="Helvetica"/>
-              </a:rPr>
-              <a:t>ninja</a:t>
-            </a:r>
-            <a:r>
-              <a:rPr lang="ru-RU" dirty="0">
-                <a:latin typeface="Helvetica"/>
-              </a:rPr>
-              <a:t> "</a:t>
-            </a:r>
-            <a:r>
-              <a:rPr lang="ru-RU" dirty="0" err="1">
-                <a:solidFill>
-                  <a:srgbClr val="FFFFFF"/>
-                </a:solidFill>
-                <a:latin typeface="Roboto"/>
-              </a:rPr>
-              <a:t>Webpack</a:t>
-            </a:r>
-            <a:r>
-              <a:rPr lang="ru-RU" dirty="0">
-                <a:solidFill>
-                  <a:srgbClr val="FFFFFF"/>
-                </a:solidFill>
-                <a:latin typeface="Roboto"/>
-              </a:rPr>
-              <a:t> </a:t>
-            </a:r>
-            <a:r>
-              <a:rPr lang="ru-RU" dirty="0" err="1">
-                <a:solidFill>
-                  <a:srgbClr val="FFFFFF"/>
-                </a:solidFill>
-                <a:latin typeface="Roboto"/>
-              </a:rPr>
-              <a:t>Tutorials</a:t>
-            </a:r>
-            <a:r>
-              <a:rPr lang="ru-RU" dirty="0">
-                <a:solidFill>
-                  <a:srgbClr val="FFFFFF"/>
-                </a:solidFill>
-                <a:latin typeface="Roboto"/>
-              </a:rPr>
-              <a:t> </a:t>
-            </a:r>
-            <a:r>
-              <a:rPr lang="ru-RU" dirty="0" err="1">
-                <a:solidFill>
-                  <a:srgbClr val="FFFFFF"/>
-                </a:solidFill>
-                <a:latin typeface="Roboto"/>
-              </a:rPr>
-              <a:t>for</a:t>
-            </a:r>
-            <a:r>
-              <a:rPr lang="ru-RU" dirty="0">
-                <a:solidFill>
-                  <a:srgbClr val="FFFFFF"/>
-                </a:solidFill>
-                <a:latin typeface="Roboto"/>
-              </a:rPr>
-              <a:t> </a:t>
-            </a:r>
-            <a:r>
-              <a:rPr lang="ru-RU" dirty="0" err="1">
-                <a:solidFill>
-                  <a:srgbClr val="FFFFFF"/>
-                </a:solidFill>
-                <a:latin typeface="Roboto"/>
-              </a:rPr>
-              <a:t>Beginners</a:t>
-            </a:r>
-            <a:r>
-              <a:rPr lang="ru-RU" dirty="0">
-                <a:latin typeface="Helvetica"/>
-              </a:rPr>
-              <a:t>"</a:t>
-            </a:r>
-          </a:p>
-          <a:p>
-            <a:endParaRPr lang="ru-RU" dirty="0">
-              <a:latin typeface="Century Gothic"/>
-            </a:endParaRPr>
-          </a:p>
-        </p:txBody>
-      </p:sp>
-    </p:spTree>
-    <p:extLst>
-      <p:ext uri="{BB962C8B-B14F-4D97-AF65-F5344CB8AC3E}">
-        <p14:creationId xmlns:p14="http://schemas.microsoft.com/office/powerpoint/2010/main" val="3072769633"/>
       </p:ext>
     </p:extLst>
   </p:cSld>
@@ -14000,6 +14331,283 @@
     <p:extLst>
       <p:ext uri="{BB962C8B-B14F-4D97-AF65-F5344CB8AC3E}">
         <p14:creationId xmlns:p14="http://schemas.microsoft.com/office/powerpoint/2010/main" val="1214610848"/>
+      </p:ext>
+    </p:extLst>
+  </p:cSld>
+  <p:clrMapOvr>
+    <a:masterClrMapping/>
+  </p:clrMapOvr>
+</p:sld>
+</file>
+
+<file path=ppt/slides/slide30.xml><?xml version="1.0" encoding="utf-8"?>
+<p:sld xmlns:a="http://schemas.openxmlformats.org/drawingml/2006/main" xmlns:r="http://schemas.openxmlformats.org/officeDocument/2006/relationships" xmlns:p="http://schemas.openxmlformats.org/presentationml/2006/main">
+  <p:cSld>
+    <p:spTree>
+      <p:nvGrpSpPr>
+        <p:cNvPr id="1" name=""/>
+        <p:cNvGrpSpPr/>
+        <p:nvPr/>
+      </p:nvGrpSpPr>
+      <p:grpSpPr>
+        <a:xfrm>
+          <a:off x="0" y="0"/>
+          <a:ext cx="0" cy="0"/>
+          <a:chOff x="0" y="0"/>
+          <a:chExt cx="0" cy="0"/>
+        </a:xfrm>
+      </p:grpSpPr>
+      <p:sp>
+        <p:nvSpPr>
+          <p:cNvPr id="2" name="Заголовок 1"/>
+          <p:cNvSpPr>
+            <a:spLocks noGrp="1"/>
+          </p:cNvSpPr>
+          <p:nvPr>
+            <p:ph type="title"/>
+          </p:nvPr>
+        </p:nvSpPr>
+        <p:spPr/>
+        <p:txBody>
+          <a:bodyPr/>
+          <a:lstStyle/>
+          <a:p>
+            <a:r>
+              <a:rPr lang="ru-RU" dirty="0" err="1"/>
+              <a:t>Links</a:t>
+            </a:r>
+          </a:p>
+        </p:txBody>
+      </p:sp>
+      <p:sp>
+        <p:nvSpPr>
+          <p:cNvPr id="3" name="Объект 2"/>
+          <p:cNvSpPr>
+            <a:spLocks noGrp="1"/>
+          </p:cNvSpPr>
+          <p:nvPr>
+            <p:ph idx="1"/>
+          </p:nvPr>
+        </p:nvSpPr>
+        <p:spPr>
+          <a:xfrm>
+            <a:off x="1103313" y="2052638"/>
+            <a:ext cx="10574782" cy="4195762"/>
+          </a:xfrm>
+        </p:spPr>
+        <p:txBody>
+          <a:bodyPr vert="horz" lIns="91440" tIns="45720" rIns="91440" bIns="45720" rtlCol="0" anchor="t">
+            <a:normAutofit/>
+          </a:bodyPr>
+          <a:lstStyle/>
+          <a:p>
+            <a:r>
+              <a:rPr lang="ru-RU" dirty="0">
+                <a:hlinkClick r:id="rId3"/>
+              </a:rPr>
+              <a:t>http://webpack.github.io/</a:t>
+            </a:r>
+          </a:p>
+          <a:p>
+            <a:r>
+              <a:rPr lang="ru-RU" dirty="0">
+                <a:solidFill>
+                  <a:srgbClr val="006A86"/>
+                </a:solidFill>
+                <a:latin typeface="Century Gothic"/>
+                <a:hlinkClick r:id="rId4"/>
+              </a:rPr>
+              <a:t>webpack</a:t>
+            </a:r>
+            <a:r>
+              <a:rPr lang="ru-RU" dirty="0">
+                <a:solidFill>
+                  <a:srgbClr val="006A86"/>
+                </a:solidFill>
+                <a:latin typeface="Helvetica"/>
+                <a:hlinkClick r:id="rId5"/>
+              </a:rPr>
+              <a:t>.js.org</a:t>
+            </a:r>
+            <a:r>
+              <a:rPr lang="ru-RU" dirty="0">
+                <a:latin typeface="Helvetica"/>
+              </a:rPr>
+              <a:t>  </a:t>
+            </a:r>
+            <a:r>
+              <a:rPr lang="ru-RU" dirty="0" err="1">
+                <a:latin typeface="Helvetica"/>
+              </a:rPr>
+              <a:t>Webpack</a:t>
+            </a:r>
+            <a:r>
+              <a:rPr lang="ru-RU" dirty="0">
+                <a:latin typeface="Helvetica"/>
+              </a:rPr>
+              <a:t> 2.x </a:t>
+            </a:r>
+            <a:r>
+              <a:rPr lang="ru-RU" dirty="0" err="1">
+                <a:latin typeface="Helvetica"/>
+              </a:rPr>
+              <a:t>official</a:t>
+            </a:r>
+            <a:r>
+              <a:rPr lang="ru-RU" dirty="0">
+                <a:latin typeface="Helvetica"/>
+              </a:rPr>
+              <a:t> </a:t>
+            </a:r>
+            <a:r>
+              <a:rPr lang="ru-RU" dirty="0" err="1">
+                <a:latin typeface="Helvetica"/>
+              </a:rPr>
+              <a:t>web</a:t>
+            </a:r>
+            <a:r>
+              <a:rPr lang="ru-RU" dirty="0">
+                <a:latin typeface="Helvetica"/>
+              </a:rPr>
+              <a:t> </a:t>
+            </a:r>
+            <a:r>
+              <a:rPr lang="ru-RU" dirty="0" err="1">
+                <a:latin typeface="Helvetica"/>
+              </a:rPr>
+              <a:t>site</a:t>
+            </a:r>
+          </a:p>
+          <a:p>
+            <a:r>
+              <a:rPr lang="ru-RU" dirty="0" err="1">
+                <a:latin typeface="Helvetica"/>
+              </a:rPr>
+              <a:t>Youtube</a:t>
+            </a:r>
+            <a:r>
+              <a:rPr lang="ru-RU" dirty="0">
+                <a:latin typeface="Helvetica"/>
+              </a:rPr>
+              <a:t>: </a:t>
+            </a:r>
+            <a:r>
+              <a:rPr lang="ru-RU" dirty="0" err="1">
+                <a:latin typeface="Helvetica"/>
+              </a:rPr>
+              <a:t>The</a:t>
+            </a:r>
+            <a:r>
+              <a:rPr lang="ru-RU" dirty="0">
+                <a:latin typeface="Helvetica"/>
+              </a:rPr>
+              <a:t> </a:t>
+            </a:r>
+            <a:r>
+              <a:rPr lang="ru-RU" dirty="0" err="1">
+                <a:latin typeface="Helvetica"/>
+              </a:rPr>
+              <a:t>net</a:t>
+            </a:r>
+            <a:r>
+              <a:rPr lang="ru-RU" dirty="0">
+                <a:latin typeface="Helvetica"/>
+              </a:rPr>
+              <a:t> </a:t>
+            </a:r>
+            <a:r>
+              <a:rPr lang="ru-RU" dirty="0" err="1">
+                <a:latin typeface="Helvetica"/>
+              </a:rPr>
+              <a:t>ninja</a:t>
+            </a:r>
+            <a:r>
+              <a:rPr lang="ru-RU" dirty="0">
+                <a:latin typeface="Helvetica"/>
+              </a:rPr>
+              <a:t> "</a:t>
+            </a:r>
+            <a:r>
+              <a:rPr lang="ru-RU" dirty="0" err="1">
+                <a:solidFill>
+                  <a:srgbClr val="FFFFFF"/>
+                </a:solidFill>
+                <a:latin typeface="Roboto"/>
+              </a:rPr>
+              <a:t>Webpack</a:t>
+            </a:r>
+            <a:r>
+              <a:rPr lang="ru-RU" dirty="0">
+                <a:solidFill>
+                  <a:srgbClr val="FFFFFF"/>
+                </a:solidFill>
+                <a:latin typeface="Roboto"/>
+              </a:rPr>
+              <a:t> </a:t>
+            </a:r>
+            <a:r>
+              <a:rPr lang="ru-RU" dirty="0" err="1">
+                <a:solidFill>
+                  <a:srgbClr val="FFFFFF"/>
+                </a:solidFill>
+                <a:latin typeface="Roboto"/>
+              </a:rPr>
+              <a:t>Tutorials</a:t>
+            </a:r>
+            <a:r>
+              <a:rPr lang="ru-RU" dirty="0">
+                <a:solidFill>
+                  <a:srgbClr val="FFFFFF"/>
+                </a:solidFill>
+                <a:latin typeface="Roboto"/>
+              </a:rPr>
+              <a:t> </a:t>
+            </a:r>
+            <a:r>
+              <a:rPr lang="ru-RU" dirty="0" err="1">
+                <a:solidFill>
+                  <a:srgbClr val="FFFFFF"/>
+                </a:solidFill>
+                <a:latin typeface="Roboto"/>
+              </a:rPr>
+              <a:t>for</a:t>
+            </a:r>
+            <a:r>
+              <a:rPr lang="ru-RU" dirty="0">
+                <a:solidFill>
+                  <a:srgbClr val="FFFFFF"/>
+                </a:solidFill>
+                <a:latin typeface="Roboto"/>
+              </a:rPr>
+              <a:t> </a:t>
+            </a:r>
+            <a:r>
+              <a:rPr lang="ru-RU" dirty="0" err="1">
+                <a:solidFill>
+                  <a:srgbClr val="FFFFFF"/>
+                </a:solidFill>
+                <a:latin typeface="Roboto"/>
+              </a:rPr>
+              <a:t>Beginners</a:t>
+            </a:r>
+            <a:r>
+              <a:rPr lang="ru-RU" dirty="0">
+                <a:latin typeface="Helvetica"/>
+              </a:rPr>
+              <a:t>"</a:t>
+            </a:r>
+          </a:p>
+          <a:p>
+            <a:endParaRPr lang="ru-RU" dirty="0">
+              <a:latin typeface="Century Gothic"/>
+            </a:endParaRPr>
+          </a:p>
+        </p:txBody>
+      </p:sp>
+    </p:spTree>
+    <p:extLst>
+      <p:ext uri="{BB962C8B-B14F-4D97-AF65-F5344CB8AC3E}">
+        <p14:creationId xmlns:p14="http://schemas.microsoft.com/office/powerpoint/2010/main" val="3072769633"/>
       </p:ext>
     </p:extLst>
   </p:cSld>

</xml_diff>